<commit_message>
add slides to presintation and real articles to the front-end
</commit_message>
<xml_diff>
--- a/KafkaWorkshop.pptx
+++ b/KafkaWorkshop.pptx
@@ -5,49 +5,51 @@
     <p:sldMasterId id="2147483659" r:id="rId1"/>
   </p:sldMasterIdLst>
   <p:notesMasterIdLst>
-    <p:notesMasterId r:id="rId32"/>
+    <p:notesMasterId r:id="rId34"/>
   </p:notesMasterIdLst>
   <p:sldIdLst>
     <p:sldId id="256" r:id="rId2"/>
     <p:sldId id="257" r:id="rId3"/>
     <p:sldId id="258" r:id="rId4"/>
-    <p:sldId id="259" r:id="rId5"/>
-    <p:sldId id="260" r:id="rId6"/>
-    <p:sldId id="261" r:id="rId7"/>
-    <p:sldId id="262" r:id="rId8"/>
-    <p:sldId id="263" r:id="rId9"/>
-    <p:sldId id="264" r:id="rId10"/>
-    <p:sldId id="265" r:id="rId11"/>
-    <p:sldId id="266" r:id="rId12"/>
-    <p:sldId id="267" r:id="rId13"/>
-    <p:sldId id="268" r:id="rId14"/>
-    <p:sldId id="269" r:id="rId15"/>
-    <p:sldId id="270" r:id="rId16"/>
-    <p:sldId id="271" r:id="rId17"/>
-    <p:sldId id="272" r:id="rId18"/>
-    <p:sldId id="273" r:id="rId19"/>
-    <p:sldId id="274" r:id="rId20"/>
-    <p:sldId id="275" r:id="rId21"/>
-    <p:sldId id="276" r:id="rId22"/>
-    <p:sldId id="277" r:id="rId23"/>
-    <p:sldId id="278" r:id="rId24"/>
-    <p:sldId id="279" r:id="rId25"/>
-    <p:sldId id="280" r:id="rId26"/>
-    <p:sldId id="281" r:id="rId27"/>
-    <p:sldId id="282" r:id="rId28"/>
-    <p:sldId id="283" r:id="rId29"/>
-    <p:sldId id="285" r:id="rId30"/>
-    <p:sldId id="284" r:id="rId31"/>
+    <p:sldId id="260" r:id="rId5"/>
+    <p:sldId id="261" r:id="rId6"/>
+    <p:sldId id="262" r:id="rId7"/>
+    <p:sldId id="263" r:id="rId8"/>
+    <p:sldId id="264" r:id="rId9"/>
+    <p:sldId id="265" r:id="rId10"/>
+    <p:sldId id="266" r:id="rId11"/>
+    <p:sldId id="267" r:id="rId12"/>
+    <p:sldId id="268" r:id="rId13"/>
+    <p:sldId id="269" r:id="rId14"/>
+    <p:sldId id="270" r:id="rId15"/>
+    <p:sldId id="271" r:id="rId16"/>
+    <p:sldId id="272" r:id="rId17"/>
+    <p:sldId id="273" r:id="rId18"/>
+    <p:sldId id="274" r:id="rId19"/>
+    <p:sldId id="275" r:id="rId20"/>
+    <p:sldId id="276" r:id="rId21"/>
+    <p:sldId id="277" r:id="rId22"/>
+    <p:sldId id="278" r:id="rId23"/>
+    <p:sldId id="279" r:id="rId24"/>
+    <p:sldId id="280" r:id="rId25"/>
+    <p:sldId id="281" r:id="rId26"/>
+    <p:sldId id="282" r:id="rId27"/>
+    <p:sldId id="259" r:id="rId28"/>
+    <p:sldId id="286" r:id="rId29"/>
+    <p:sldId id="287" r:id="rId30"/>
+    <p:sldId id="283" r:id="rId31"/>
+    <p:sldId id="285" r:id="rId32"/>
+    <p:sldId id="284" r:id="rId33"/>
   </p:sldIdLst>
   <p:sldSz cx="9144000" cy="5143500" type="screen16x9"/>
   <p:notesSz cx="6858000" cy="9144000"/>
   <p:embeddedFontLst>
     <p:embeddedFont>
       <p:font typeface="Roboto" panose="020B0604020202020204" charset="0"/>
-      <p:regular r:id="rId33"/>
-      <p:bold r:id="rId34"/>
-      <p:italic r:id="rId35"/>
-      <p:boldItalic r:id="rId36"/>
+      <p:regular r:id="rId35"/>
+      <p:bold r:id="rId36"/>
+      <p:italic r:id="rId37"/>
+      <p:boldItalic r:id="rId38"/>
     </p:embeddedFont>
   </p:embeddedFontLst>
   <p:defaultTextStyle>
@@ -848,7 +850,7 @@
   <p:cSld>
     <p:spTree>
       <p:nvGrpSpPr>
-        <p:cNvPr id="1" name="Shape 149"/>
+        <p:cNvPr id="1" name="Shape 164"/>
         <p:cNvGrpSpPr/>
         <p:nvPr/>
       </p:nvGrpSpPr>
@@ -862,7 +864,7 @@
       </p:grpSpPr>
       <p:sp>
         <p:nvSpPr>
-          <p:cNvPr id="150" name="Google Shape;150;g75b5936763_0_294:notes"/>
+          <p:cNvPr id="165" name="Google Shape;165;g75b5936763_0_308:notes"/>
           <p:cNvSpPr>
             <a:spLocks noGrp="1" noRot="1" noChangeAspect="1"/>
           </p:cNvSpPr>
@@ -903,7 +905,7 @@
       </p:sp>
       <p:sp>
         <p:nvSpPr>
-          <p:cNvPr id="151" name="Google Shape;151;g75b5936763_0_294:notes"/>
+          <p:cNvPr id="166" name="Google Shape;166;g75b5936763_0_308:notes"/>
           <p:cNvSpPr txBox="1">
             <a:spLocks noGrp="1"/>
           </p:cNvSpPr>
@@ -952,7 +954,7 @@
   <p:cSld>
     <p:spTree>
       <p:nvGrpSpPr>
-        <p:cNvPr id="1" name="Shape 164"/>
+        <p:cNvPr id="1" name="Shape 184"/>
         <p:cNvGrpSpPr/>
         <p:nvPr/>
       </p:nvGrpSpPr>
@@ -966,7 +968,7 @@
       </p:grpSpPr>
       <p:sp>
         <p:nvSpPr>
-          <p:cNvPr id="165" name="Google Shape;165;g75b5936763_0_308:notes"/>
+          <p:cNvPr id="185" name="Google Shape;185;g75b5936763_0_349:notes"/>
           <p:cNvSpPr>
             <a:spLocks noGrp="1" noRot="1" noChangeAspect="1"/>
           </p:cNvSpPr>
@@ -1007,7 +1009,7 @@
       </p:sp>
       <p:sp>
         <p:nvSpPr>
-          <p:cNvPr id="166" name="Google Shape;166;g75b5936763_0_308:notes"/>
+          <p:cNvPr id="186" name="Google Shape;186;g75b5936763_0_349:notes"/>
           <p:cNvSpPr txBox="1">
             <a:spLocks noGrp="1"/>
           </p:cNvSpPr>
@@ -1056,7 +1058,7 @@
   <p:cSld>
     <p:spTree>
       <p:nvGrpSpPr>
-        <p:cNvPr id="1" name="Shape 184"/>
+        <p:cNvPr id="1" name="Shape 195"/>
         <p:cNvGrpSpPr/>
         <p:nvPr/>
       </p:nvGrpSpPr>
@@ -1070,7 +1072,7 @@
       </p:grpSpPr>
       <p:sp>
         <p:nvSpPr>
-          <p:cNvPr id="185" name="Google Shape;185;g75b5936763_0_349:notes"/>
+          <p:cNvPr id="196" name="Google Shape;196;g75b5936763_0_361:notes"/>
           <p:cNvSpPr>
             <a:spLocks noGrp="1" noRot="1" noChangeAspect="1"/>
           </p:cNvSpPr>
@@ -1111,7 +1113,7 @@
       </p:sp>
       <p:sp>
         <p:nvSpPr>
-          <p:cNvPr id="186" name="Google Shape;186;g75b5936763_0_349:notes"/>
+          <p:cNvPr id="197" name="Google Shape;197;g75b5936763_0_361:notes"/>
           <p:cNvSpPr txBox="1">
             <a:spLocks noGrp="1"/>
           </p:cNvSpPr>
@@ -1160,7 +1162,7 @@
   <p:cSld>
     <p:spTree>
       <p:nvGrpSpPr>
-        <p:cNvPr id="1" name="Shape 195"/>
+        <p:cNvPr id="1" name="Shape 206"/>
         <p:cNvGrpSpPr/>
         <p:nvPr/>
       </p:nvGrpSpPr>
@@ -1174,7 +1176,7 @@
       </p:grpSpPr>
       <p:sp>
         <p:nvSpPr>
-          <p:cNvPr id="196" name="Google Shape;196;g75b5936763_0_361:notes"/>
+          <p:cNvPr id="207" name="Google Shape;207;g75b5936763_0_371:notes"/>
           <p:cNvSpPr>
             <a:spLocks noGrp="1" noRot="1" noChangeAspect="1"/>
           </p:cNvSpPr>
@@ -1215,7 +1217,7 @@
       </p:sp>
       <p:sp>
         <p:nvSpPr>
-          <p:cNvPr id="197" name="Google Shape;197;g75b5936763_0_361:notes"/>
+          <p:cNvPr id="208" name="Google Shape;208;g75b5936763_0_371:notes"/>
           <p:cNvSpPr txBox="1">
             <a:spLocks noGrp="1"/>
           </p:cNvSpPr>
@@ -1264,7 +1266,7 @@
   <p:cSld>
     <p:spTree>
       <p:nvGrpSpPr>
-        <p:cNvPr id="1" name="Shape 206"/>
+        <p:cNvPr id="1" name="Shape 217"/>
         <p:cNvGrpSpPr/>
         <p:nvPr/>
       </p:nvGrpSpPr>
@@ -1278,7 +1280,7 @@
       </p:grpSpPr>
       <p:sp>
         <p:nvSpPr>
-          <p:cNvPr id="207" name="Google Shape;207;g75b5936763_0_371:notes"/>
+          <p:cNvPr id="218" name="Google Shape;218;g75b5936763_0_381:notes"/>
           <p:cNvSpPr>
             <a:spLocks noGrp="1" noRot="1" noChangeAspect="1"/>
           </p:cNvSpPr>
@@ -1319,7 +1321,7 @@
       </p:sp>
       <p:sp>
         <p:nvSpPr>
-          <p:cNvPr id="208" name="Google Shape;208;g75b5936763_0_371:notes"/>
+          <p:cNvPr id="219" name="Google Shape;219;g75b5936763_0_381:notes"/>
           <p:cNvSpPr txBox="1">
             <a:spLocks noGrp="1"/>
           </p:cNvSpPr>
@@ -1368,7 +1370,7 @@
   <p:cSld>
     <p:spTree>
       <p:nvGrpSpPr>
-        <p:cNvPr id="1" name="Shape 217"/>
+        <p:cNvPr id="1" name="Shape 236"/>
         <p:cNvGrpSpPr/>
         <p:nvPr/>
       </p:nvGrpSpPr>
@@ -1382,7 +1384,7 @@
       </p:grpSpPr>
       <p:sp>
         <p:nvSpPr>
-          <p:cNvPr id="218" name="Google Shape;218;g75b5936763_0_381:notes"/>
+          <p:cNvPr id="237" name="Google Shape;237;g75b5936763_0_211:notes"/>
           <p:cNvSpPr>
             <a:spLocks noGrp="1" noRot="1" noChangeAspect="1"/>
           </p:cNvSpPr>
@@ -1392,7 +1394,7 @@
         </p:nvSpPr>
         <p:spPr>
           <a:xfrm>
-            <a:off x="381000" y="685800"/>
+            <a:off x="381300" y="685800"/>
             <a:ext cx="6096000" cy="3429000"/>
           </a:xfrm>
           <a:custGeom>
@@ -1423,7 +1425,7 @@
       </p:sp>
       <p:sp>
         <p:nvSpPr>
-          <p:cNvPr id="219" name="Google Shape;219;g75b5936763_0_381:notes"/>
+          <p:cNvPr id="238" name="Google Shape;238;g75b5936763_0_211:notes"/>
           <p:cNvSpPr txBox="1">
             <a:spLocks noGrp="1"/>
           </p:cNvSpPr>
@@ -1472,7 +1474,7 @@
   <p:cSld>
     <p:spTree>
       <p:nvGrpSpPr>
-        <p:cNvPr id="1" name="Shape 236"/>
+        <p:cNvPr id="1" name="Shape 243"/>
         <p:cNvGrpSpPr/>
         <p:nvPr/>
       </p:nvGrpSpPr>
@@ -1486,7 +1488,7 @@
       </p:grpSpPr>
       <p:sp>
         <p:nvSpPr>
-          <p:cNvPr id="237" name="Google Shape;237;g75b5936763_0_211:notes"/>
+          <p:cNvPr id="244" name="Google Shape;244;g75b5936763_0_405:notes"/>
           <p:cNvSpPr>
             <a:spLocks noGrp="1" noRot="1" noChangeAspect="1"/>
           </p:cNvSpPr>
@@ -1496,7 +1498,7 @@
         </p:nvSpPr>
         <p:spPr>
           <a:xfrm>
-            <a:off x="381300" y="685800"/>
+            <a:off x="381000" y="685800"/>
             <a:ext cx="6096000" cy="3429000"/>
           </a:xfrm>
           <a:custGeom>
@@ -1527,7 +1529,7 @@
       </p:sp>
       <p:sp>
         <p:nvSpPr>
-          <p:cNvPr id="238" name="Google Shape;238;g75b5936763_0_211:notes"/>
+          <p:cNvPr id="245" name="Google Shape;245;g75b5936763_0_405:notes"/>
           <p:cNvSpPr txBox="1">
             <a:spLocks noGrp="1"/>
           </p:cNvSpPr>
@@ -1576,7 +1578,7 @@
   <p:cSld>
     <p:spTree>
       <p:nvGrpSpPr>
-        <p:cNvPr id="1" name="Shape 243"/>
+        <p:cNvPr id="1" name="Shape 270"/>
         <p:cNvGrpSpPr/>
         <p:nvPr/>
       </p:nvGrpSpPr>
@@ -1590,7 +1592,7 @@
       </p:grpSpPr>
       <p:sp>
         <p:nvSpPr>
-          <p:cNvPr id="244" name="Google Shape;244;g75b5936763_0_405:notes"/>
+          <p:cNvPr id="271" name="Google Shape;271;g75b5936763_0_436:notes"/>
           <p:cNvSpPr>
             <a:spLocks noGrp="1" noRot="1" noChangeAspect="1"/>
           </p:cNvSpPr>
@@ -1631,7 +1633,7 @@
       </p:sp>
       <p:sp>
         <p:nvSpPr>
-          <p:cNvPr id="245" name="Google Shape;245;g75b5936763_0_405:notes"/>
+          <p:cNvPr id="272" name="Google Shape;272;g75b5936763_0_436:notes"/>
           <p:cNvSpPr txBox="1">
             <a:spLocks noGrp="1"/>
           </p:cNvSpPr>
@@ -1680,7 +1682,7 @@
   <p:cSld>
     <p:spTree>
       <p:nvGrpSpPr>
-        <p:cNvPr id="1" name="Shape 270"/>
+        <p:cNvPr id="1" name="Shape 278"/>
         <p:cNvGrpSpPr/>
         <p:nvPr/>
       </p:nvGrpSpPr>
@@ -1694,7 +1696,7 @@
       </p:grpSpPr>
       <p:sp>
         <p:nvSpPr>
-          <p:cNvPr id="271" name="Google Shape;271;g75b5936763_0_436:notes"/>
+          <p:cNvPr id="279" name="Google Shape;279;g75b788407c_0_130:notes"/>
           <p:cNvSpPr>
             <a:spLocks noGrp="1" noRot="1" noChangeAspect="1"/>
           </p:cNvSpPr>
@@ -1704,7 +1706,7 @@
         </p:nvSpPr>
         <p:spPr>
           <a:xfrm>
-            <a:off x="381000" y="685800"/>
+            <a:off x="381300" y="685800"/>
             <a:ext cx="6096000" cy="3429000"/>
           </a:xfrm>
           <a:custGeom>
@@ -1735,7 +1737,7 @@
       </p:sp>
       <p:sp>
         <p:nvSpPr>
-          <p:cNvPr id="272" name="Google Shape;272;g75b5936763_0_436:notes"/>
+          <p:cNvPr id="280" name="Google Shape;280;g75b788407c_0_130:notes"/>
           <p:cNvSpPr txBox="1">
             <a:spLocks noGrp="1"/>
           </p:cNvSpPr>
@@ -1784,7 +1786,7 @@
   <p:cSld>
     <p:spTree>
       <p:nvGrpSpPr>
-        <p:cNvPr id="1" name="Shape 278"/>
+        <p:cNvPr id="1" name="Shape 292"/>
         <p:cNvGrpSpPr/>
         <p:nvPr/>
       </p:nvGrpSpPr>
@@ -1798,7 +1800,7 @@
       </p:grpSpPr>
       <p:sp>
         <p:nvSpPr>
-          <p:cNvPr id="279" name="Google Shape;279;g75b788407c_0_130:notes"/>
+          <p:cNvPr id="293" name="Google Shape;293;g75b788407c_0_155:notes"/>
           <p:cNvSpPr>
             <a:spLocks noGrp="1" noRot="1" noChangeAspect="1"/>
           </p:cNvSpPr>
@@ -1808,7 +1810,7 @@
         </p:nvSpPr>
         <p:spPr>
           <a:xfrm>
-            <a:off x="381300" y="685800"/>
+            <a:off x="381000" y="685800"/>
             <a:ext cx="6096000" cy="3429000"/>
           </a:xfrm>
           <a:custGeom>
@@ -1839,7 +1841,7 @@
       </p:sp>
       <p:sp>
         <p:nvSpPr>
-          <p:cNvPr id="280" name="Google Shape;280;g75b788407c_0_130:notes"/>
+          <p:cNvPr id="294" name="Google Shape;294;g75b788407c_0_155:notes"/>
           <p:cNvSpPr txBox="1">
             <a:spLocks noGrp="1"/>
           </p:cNvSpPr>
@@ -1992,7 +1994,7 @@
   <p:cSld>
     <p:spTree>
       <p:nvGrpSpPr>
-        <p:cNvPr id="1" name="Shape 292"/>
+        <p:cNvPr id="1" name="Shape 315"/>
         <p:cNvGrpSpPr/>
         <p:nvPr/>
       </p:nvGrpSpPr>
@@ -2006,7 +2008,7 @@
       </p:grpSpPr>
       <p:sp>
         <p:nvSpPr>
-          <p:cNvPr id="293" name="Google Shape;293;g75b788407c_0_155:notes"/>
+          <p:cNvPr id="316" name="Google Shape;316;g75b788407c_0_222:notes"/>
           <p:cNvSpPr>
             <a:spLocks noGrp="1" noRot="1" noChangeAspect="1"/>
           </p:cNvSpPr>
@@ -2047,7 +2049,7 @@
       </p:sp>
       <p:sp>
         <p:nvSpPr>
-          <p:cNvPr id="294" name="Google Shape;294;g75b788407c_0_155:notes"/>
+          <p:cNvPr id="317" name="Google Shape;317;g75b788407c_0_222:notes"/>
           <p:cNvSpPr txBox="1">
             <a:spLocks noGrp="1"/>
           </p:cNvSpPr>
@@ -2096,7 +2098,7 @@
   <p:cSld>
     <p:spTree>
       <p:nvGrpSpPr>
-        <p:cNvPr id="1" name="Shape 315"/>
+        <p:cNvPr id="1" name="Shape 343"/>
         <p:cNvGrpSpPr/>
         <p:nvPr/>
       </p:nvGrpSpPr>
@@ -2110,7 +2112,7 @@
       </p:grpSpPr>
       <p:sp>
         <p:nvSpPr>
-          <p:cNvPr id="316" name="Google Shape;316;g75b788407c_0_222:notes"/>
+          <p:cNvPr id="344" name="Google Shape;344;g75b788407c_0_191:notes"/>
           <p:cNvSpPr>
             <a:spLocks noGrp="1" noRot="1" noChangeAspect="1"/>
           </p:cNvSpPr>
@@ -2151,7 +2153,7 @@
       </p:sp>
       <p:sp>
         <p:nvSpPr>
-          <p:cNvPr id="317" name="Google Shape;317;g75b788407c_0_222:notes"/>
+          <p:cNvPr id="345" name="Google Shape;345;g75b788407c_0_191:notes"/>
           <p:cNvSpPr txBox="1">
             <a:spLocks noGrp="1"/>
           </p:cNvSpPr>
@@ -2200,7 +2202,7 @@
   <p:cSld>
     <p:spTree>
       <p:nvGrpSpPr>
-        <p:cNvPr id="1" name="Shape 343"/>
+        <p:cNvPr id="1" name="Shape 383"/>
         <p:cNvGrpSpPr/>
         <p:nvPr/>
       </p:nvGrpSpPr>
@@ -2214,7 +2216,7 @@
       </p:grpSpPr>
       <p:sp>
         <p:nvSpPr>
-          <p:cNvPr id="344" name="Google Shape;344;g75b788407c_0_191:notes"/>
+          <p:cNvPr id="384" name="Google Shape;384;g75b788407c_0_0:notes"/>
           <p:cNvSpPr>
             <a:spLocks noGrp="1" noRot="1" noChangeAspect="1"/>
           </p:cNvSpPr>
@@ -2224,7 +2226,7 @@
         </p:nvSpPr>
         <p:spPr>
           <a:xfrm>
-            <a:off x="381000" y="685800"/>
+            <a:off x="381300" y="685800"/>
             <a:ext cx="6096000" cy="3429000"/>
           </a:xfrm>
           <a:custGeom>
@@ -2255,7 +2257,7 @@
       </p:sp>
       <p:sp>
         <p:nvSpPr>
-          <p:cNvPr id="345" name="Google Shape;345;g75b788407c_0_191:notes"/>
+          <p:cNvPr id="385" name="Google Shape;385;g75b788407c_0_0:notes"/>
           <p:cNvSpPr txBox="1">
             <a:spLocks noGrp="1"/>
           </p:cNvSpPr>
@@ -2304,7 +2306,7 @@
   <p:cSld>
     <p:spTree>
       <p:nvGrpSpPr>
-        <p:cNvPr id="1" name="Shape 383"/>
+        <p:cNvPr id="1" name="Shape 416"/>
         <p:cNvGrpSpPr/>
         <p:nvPr/>
       </p:nvGrpSpPr>
@@ -2318,7 +2320,7 @@
       </p:grpSpPr>
       <p:sp>
         <p:nvSpPr>
-          <p:cNvPr id="384" name="Google Shape;384;g75b788407c_0_0:notes"/>
+          <p:cNvPr id="417" name="Google Shape;417;g75b788407c_0_36:notes"/>
           <p:cNvSpPr>
             <a:spLocks noGrp="1" noRot="1" noChangeAspect="1"/>
           </p:cNvSpPr>
@@ -2328,7 +2330,7 @@
         </p:nvSpPr>
         <p:spPr>
           <a:xfrm>
-            <a:off x="381300" y="685800"/>
+            <a:off x="381000" y="685800"/>
             <a:ext cx="6096000" cy="3429000"/>
           </a:xfrm>
           <a:custGeom>
@@ -2359,7 +2361,7 @@
       </p:sp>
       <p:sp>
         <p:nvSpPr>
-          <p:cNvPr id="385" name="Google Shape;385;g75b788407c_0_0:notes"/>
+          <p:cNvPr id="418" name="Google Shape;418;g75b788407c_0_36:notes"/>
           <p:cNvSpPr txBox="1">
             <a:spLocks noGrp="1"/>
           </p:cNvSpPr>
@@ -2408,7 +2410,7 @@
   <p:cSld>
     <p:spTree>
       <p:nvGrpSpPr>
-        <p:cNvPr id="1" name="Shape 416"/>
+        <p:cNvPr id="1" name="Shape 422"/>
         <p:cNvGrpSpPr/>
         <p:nvPr/>
       </p:nvGrpSpPr>
@@ -2422,7 +2424,7 @@
       </p:grpSpPr>
       <p:sp>
         <p:nvSpPr>
-          <p:cNvPr id="417" name="Google Shape;417;g75b788407c_0_36:notes"/>
+          <p:cNvPr id="423" name="Google Shape;423;g75b788407c_0_41:notes"/>
           <p:cNvSpPr>
             <a:spLocks noGrp="1" noRot="1" noChangeAspect="1"/>
           </p:cNvSpPr>
@@ -2432,7 +2434,7 @@
         </p:nvSpPr>
         <p:spPr>
           <a:xfrm>
-            <a:off x="381000" y="685800"/>
+            <a:off x="381300" y="685800"/>
             <a:ext cx="6096000" cy="3429000"/>
           </a:xfrm>
           <a:custGeom>
@@ -2463,7 +2465,7 @@
       </p:sp>
       <p:sp>
         <p:nvSpPr>
-          <p:cNvPr id="418" name="Google Shape;418;g75b788407c_0_36:notes"/>
+          <p:cNvPr id="424" name="Google Shape;424;g75b788407c_0_41:notes"/>
           <p:cNvSpPr txBox="1">
             <a:spLocks noGrp="1"/>
           </p:cNvSpPr>
@@ -2512,7 +2514,7 @@
   <p:cSld>
     <p:spTree>
       <p:nvGrpSpPr>
-        <p:cNvPr id="1" name="Shape 422"/>
+        <p:cNvPr id="1" name="Shape 460"/>
         <p:cNvGrpSpPr/>
         <p:nvPr/>
       </p:nvGrpSpPr>
@@ -2526,7 +2528,7 @@
       </p:grpSpPr>
       <p:sp>
         <p:nvSpPr>
-          <p:cNvPr id="423" name="Google Shape;423;g75b788407c_0_41:notes"/>
+          <p:cNvPr id="461" name="Google Shape;461;g75b788407c_0_108:notes"/>
           <p:cNvSpPr>
             <a:spLocks noGrp="1" noRot="1" noChangeAspect="1"/>
           </p:cNvSpPr>
@@ -2567,7 +2569,7 @@
       </p:sp>
       <p:sp>
         <p:nvSpPr>
-          <p:cNvPr id="424" name="Google Shape;424;g75b788407c_0_41:notes"/>
+          <p:cNvPr id="462" name="Google Shape;462;g75b788407c_0_108:notes"/>
           <p:cNvSpPr txBox="1">
             <a:spLocks noGrp="1"/>
           </p:cNvSpPr>
@@ -2616,7 +2618,7 @@
   <p:cSld>
     <p:spTree>
       <p:nvGrpSpPr>
-        <p:cNvPr id="1" name="Shape 460"/>
+        <p:cNvPr id="1" name="Shape 475"/>
         <p:cNvGrpSpPr/>
         <p:nvPr/>
       </p:nvGrpSpPr>
@@ -2630,7 +2632,7 @@
       </p:grpSpPr>
       <p:sp>
         <p:nvSpPr>
-          <p:cNvPr id="461" name="Google Shape;461;g75b788407c_0_108:notes"/>
+          <p:cNvPr id="476" name="Google Shape;476;g75b788407c_0_123:notes"/>
           <p:cNvSpPr>
             <a:spLocks noGrp="1" noRot="1" noChangeAspect="1"/>
           </p:cNvSpPr>
@@ -2671,7 +2673,7 @@
       </p:sp>
       <p:sp>
         <p:nvSpPr>
-          <p:cNvPr id="462" name="Google Shape;462;g75b788407c_0_108:notes"/>
+          <p:cNvPr id="477" name="Google Shape;477;g75b788407c_0_123:notes"/>
           <p:cNvSpPr txBox="1">
             <a:spLocks noGrp="1"/>
           </p:cNvSpPr>
@@ -2720,7 +2722,7 @@
   <p:cSld>
     <p:spTree>
       <p:nvGrpSpPr>
-        <p:cNvPr id="1" name="Shape 475"/>
+        <p:cNvPr id="1" name="Shape 99"/>
         <p:cNvGrpSpPr/>
         <p:nvPr/>
       </p:nvGrpSpPr>
@@ -2734,7 +2736,7 @@
       </p:grpSpPr>
       <p:sp>
         <p:nvSpPr>
-          <p:cNvPr id="476" name="Google Shape;476;g75b788407c_0_123:notes"/>
+          <p:cNvPr id="100" name="Google Shape;100;g75b788407c_0_140:notes"/>
           <p:cNvSpPr>
             <a:spLocks noGrp="1" noRot="1" noChangeAspect="1"/>
           </p:cNvSpPr>
@@ -2744,7 +2746,7 @@
         </p:nvSpPr>
         <p:spPr>
           <a:xfrm>
-            <a:off x="381300" y="685800"/>
+            <a:off x="381000" y="685800"/>
             <a:ext cx="6096000" cy="3429000"/>
           </a:xfrm>
           <a:custGeom>
@@ -2775,7 +2777,7 @@
       </p:sp>
       <p:sp>
         <p:nvSpPr>
-          <p:cNvPr id="477" name="Google Shape;477;g75b788407c_0_123:notes"/>
+          <p:cNvPr id="101" name="Google Shape;101;g75b788407c_0_140:notes"/>
           <p:cNvSpPr txBox="1">
             <a:spLocks noGrp="1"/>
           </p:cNvSpPr>
@@ -3136,7 +3138,7 @@
   <p:cSld>
     <p:spTree>
       <p:nvGrpSpPr>
-        <p:cNvPr id="1" name="Shape 99"/>
+        <p:cNvPr id="1" name="Shape 105"/>
         <p:cNvGrpSpPr/>
         <p:nvPr/>
       </p:nvGrpSpPr>
@@ -3150,7 +3152,7 @@
       </p:grpSpPr>
       <p:sp>
         <p:nvSpPr>
-          <p:cNvPr id="100" name="Google Shape;100;g75b788407c_0_140:notes"/>
+          <p:cNvPr id="106" name="Google Shape;106;g75b5936763_0_240:notes"/>
           <p:cNvSpPr>
             <a:spLocks noGrp="1" noRot="1" noChangeAspect="1"/>
           </p:cNvSpPr>
@@ -3191,7 +3193,7 @@
       </p:sp>
       <p:sp>
         <p:nvSpPr>
-          <p:cNvPr id="101" name="Google Shape;101;g75b788407c_0_140:notes"/>
+          <p:cNvPr id="107" name="Google Shape;107;g75b5936763_0_240:notes"/>
           <p:cNvSpPr txBox="1">
             <a:spLocks noGrp="1"/>
           </p:cNvSpPr>
@@ -3240,7 +3242,7 @@
   <p:cSld>
     <p:spTree>
       <p:nvGrpSpPr>
-        <p:cNvPr id="1" name="Shape 105"/>
+        <p:cNvPr id="1" name="Shape 112"/>
         <p:cNvGrpSpPr/>
         <p:nvPr/>
       </p:nvGrpSpPr>
@@ -3254,7 +3256,7 @@
       </p:grpSpPr>
       <p:sp>
         <p:nvSpPr>
-          <p:cNvPr id="106" name="Google Shape;106;g75b5936763_0_240:notes"/>
+          <p:cNvPr id="113" name="Google Shape;113;g75b5936763_0_235:notes"/>
           <p:cNvSpPr>
             <a:spLocks noGrp="1" noRot="1" noChangeAspect="1"/>
           </p:cNvSpPr>
@@ -3295,7 +3297,7 @@
       </p:sp>
       <p:sp>
         <p:nvSpPr>
-          <p:cNvPr id="107" name="Google Shape;107;g75b5936763_0_240:notes"/>
+          <p:cNvPr id="114" name="Google Shape;114;g75b5936763_0_235:notes"/>
           <p:cNvSpPr txBox="1">
             <a:spLocks noGrp="1"/>
           </p:cNvSpPr>
@@ -3344,7 +3346,7 @@
   <p:cSld>
     <p:spTree>
       <p:nvGrpSpPr>
-        <p:cNvPr id="1" name="Shape 112"/>
+        <p:cNvPr id="1" name="Shape 118"/>
         <p:cNvGrpSpPr/>
         <p:nvPr/>
       </p:nvGrpSpPr>
@@ -3358,7 +3360,7 @@
       </p:grpSpPr>
       <p:sp>
         <p:nvSpPr>
-          <p:cNvPr id="113" name="Google Shape;113;g75b5936763_0_235:notes"/>
+          <p:cNvPr id="119" name="Google Shape;119;g75b5936763_0_261:notes"/>
           <p:cNvSpPr>
             <a:spLocks noGrp="1" noRot="1" noChangeAspect="1"/>
           </p:cNvSpPr>
@@ -3399,7 +3401,7 @@
       </p:sp>
       <p:sp>
         <p:nvSpPr>
-          <p:cNvPr id="114" name="Google Shape;114;g75b5936763_0_235:notes"/>
+          <p:cNvPr id="120" name="Google Shape;120;g75b5936763_0_261:notes"/>
           <p:cNvSpPr txBox="1">
             <a:spLocks noGrp="1"/>
           </p:cNvSpPr>
@@ -3448,7 +3450,7 @@
   <p:cSld>
     <p:spTree>
       <p:nvGrpSpPr>
-        <p:cNvPr id="1" name="Shape 118"/>
+        <p:cNvPr id="1" name="Shape 124"/>
         <p:cNvGrpSpPr/>
         <p:nvPr/>
       </p:nvGrpSpPr>
@@ -3462,7 +3464,7 @@
       </p:grpSpPr>
       <p:sp>
         <p:nvSpPr>
-          <p:cNvPr id="119" name="Google Shape;119;g75b5936763_0_261:notes"/>
+          <p:cNvPr id="125" name="Google Shape;125;g75b5936763_0_266:notes"/>
           <p:cNvSpPr>
             <a:spLocks noGrp="1" noRot="1" noChangeAspect="1"/>
           </p:cNvSpPr>
@@ -3472,7 +3474,7 @@
         </p:nvSpPr>
         <p:spPr>
           <a:xfrm>
-            <a:off x="381000" y="685800"/>
+            <a:off x="381300" y="685800"/>
             <a:ext cx="6096000" cy="3429000"/>
           </a:xfrm>
           <a:custGeom>
@@ -3503,7 +3505,7 @@
       </p:sp>
       <p:sp>
         <p:nvSpPr>
-          <p:cNvPr id="120" name="Google Shape;120;g75b5936763_0_261:notes"/>
+          <p:cNvPr id="126" name="Google Shape;126;g75b5936763_0_266:notes"/>
           <p:cNvSpPr txBox="1">
             <a:spLocks noGrp="1"/>
           </p:cNvSpPr>
@@ -3552,7 +3554,7 @@
   <p:cSld>
     <p:spTree>
       <p:nvGrpSpPr>
-        <p:cNvPr id="1" name="Shape 124"/>
+        <p:cNvPr id="1" name="Shape 134"/>
         <p:cNvGrpSpPr/>
         <p:nvPr/>
       </p:nvGrpSpPr>
@@ -3566,7 +3568,7 @@
       </p:grpSpPr>
       <p:sp>
         <p:nvSpPr>
-          <p:cNvPr id="125" name="Google Shape;125;g75b5936763_0_266:notes"/>
+          <p:cNvPr id="135" name="Google Shape;135;g75b5936763_0_278:notes"/>
           <p:cNvSpPr>
             <a:spLocks noGrp="1" noRot="1" noChangeAspect="1"/>
           </p:cNvSpPr>
@@ -3576,7 +3578,7 @@
         </p:nvSpPr>
         <p:spPr>
           <a:xfrm>
-            <a:off x="381300" y="685800"/>
+            <a:off x="381000" y="685800"/>
             <a:ext cx="6096000" cy="3429000"/>
           </a:xfrm>
           <a:custGeom>
@@ -3607,7 +3609,7 @@
       </p:sp>
       <p:sp>
         <p:nvSpPr>
-          <p:cNvPr id="126" name="Google Shape;126;g75b5936763_0_266:notes"/>
+          <p:cNvPr id="136" name="Google Shape;136;g75b5936763_0_278:notes"/>
           <p:cNvSpPr txBox="1">
             <a:spLocks noGrp="1"/>
           </p:cNvSpPr>
@@ -3656,7 +3658,7 @@
   <p:cSld>
     <p:spTree>
       <p:nvGrpSpPr>
-        <p:cNvPr id="1" name="Shape 134"/>
+        <p:cNvPr id="1" name="Shape 149"/>
         <p:cNvGrpSpPr/>
         <p:nvPr/>
       </p:nvGrpSpPr>
@@ -3670,7 +3672,7 @@
       </p:grpSpPr>
       <p:sp>
         <p:nvSpPr>
-          <p:cNvPr id="135" name="Google Shape;135;g75b5936763_0_278:notes"/>
+          <p:cNvPr id="150" name="Google Shape;150;g75b5936763_0_294:notes"/>
           <p:cNvSpPr>
             <a:spLocks noGrp="1" noRot="1" noChangeAspect="1"/>
           </p:cNvSpPr>
@@ -3711,7 +3713,7 @@
       </p:sp>
       <p:sp>
         <p:nvSpPr>
-          <p:cNvPr id="136" name="Google Shape;136;g75b5936763_0_278:notes"/>
+          <p:cNvPr id="151" name="Google Shape;151;g75b5936763_0_294:notes"/>
           <p:cNvSpPr txBox="1">
             <a:spLocks noGrp="1"/>
           </p:cNvSpPr>
@@ -4479,7 +4481,7 @@
             </a:pPr>
             <a:fld id="{00000000-1234-1234-1234-123412341234}" type="slidenum">
               <a:rPr lang="en-GB"/>
-              <a:t>‹nr.›</a:t>
+              <a:t>‹#›</a:t>
             </a:fld>
             <a:endParaRPr/>
           </a:p>
@@ -5192,7 +5194,7 @@
             </a:pPr>
             <a:fld id="{00000000-1234-1234-1234-123412341234}" type="slidenum">
               <a:rPr lang="en-GB"/>
-              <a:t>‹nr.›</a:t>
+              <a:t>‹#›</a:t>
             </a:fld>
             <a:endParaRPr/>
           </a:p>
@@ -5332,7 +5334,7 @@
             </a:pPr>
             <a:fld id="{00000000-1234-1234-1234-123412341234}" type="slidenum">
               <a:rPr lang="en-GB"/>
-              <a:t>‹nr.›</a:t>
+              <a:t>‹#›</a:t>
             </a:fld>
             <a:endParaRPr/>
           </a:p>
@@ -5851,7 +5853,7 @@
             </a:pPr>
             <a:fld id="{00000000-1234-1234-1234-123412341234}" type="slidenum">
               <a:rPr lang="en-GB"/>
-              <a:t>‹nr.›</a:t>
+              <a:t>‹#›</a:t>
             </a:fld>
             <a:endParaRPr/>
           </a:p>
@@ -6428,7 +6430,7 @@
             </a:pPr>
             <a:fld id="{00000000-1234-1234-1234-123412341234}" type="slidenum">
               <a:rPr lang="en-GB"/>
-              <a:t>‹nr.›</a:t>
+              <a:t>‹#›</a:t>
             </a:fld>
             <a:endParaRPr/>
           </a:p>
@@ -6955,7 +6957,7 @@
             </a:pPr>
             <a:fld id="{00000000-1234-1234-1234-123412341234}" type="slidenum">
               <a:rPr lang="en-GB"/>
-              <a:t>‹nr.›</a:t>
+              <a:t>‹#›</a:t>
             </a:fld>
             <a:endParaRPr/>
           </a:p>
@@ -7224,7 +7226,7 @@
             </a:pPr>
             <a:fld id="{00000000-1234-1234-1234-123412341234}" type="slidenum">
               <a:rPr lang="en-GB"/>
-              <a:t>‹nr.›</a:t>
+              <a:t>‹#›</a:t>
             </a:fld>
             <a:endParaRPr/>
           </a:p>
@@ -7622,7 +7624,7 @@
             </a:pPr>
             <a:fld id="{00000000-1234-1234-1234-123412341234}" type="slidenum">
               <a:rPr lang="en-GB"/>
-              <a:t>‹nr.›</a:t>
+              <a:t>‹#›</a:t>
             </a:fld>
             <a:endParaRPr/>
           </a:p>
@@ -8141,7 +8143,7 @@
             </a:pPr>
             <a:fld id="{00000000-1234-1234-1234-123412341234}" type="slidenum">
               <a:rPr lang="en-GB"/>
-              <a:t>‹nr.›</a:t>
+              <a:t>‹#›</a:t>
             </a:fld>
             <a:endParaRPr/>
           </a:p>
@@ -8788,7 +8790,7 @@
             </a:pPr>
             <a:fld id="{00000000-1234-1234-1234-123412341234}" type="slidenum">
               <a:rPr lang="en-GB"/>
-              <a:t>‹nr.›</a:t>
+              <a:t>‹#›</a:t>
             </a:fld>
             <a:endParaRPr/>
           </a:p>
@@ -8972,7 +8974,7 @@
             </a:pPr>
             <a:fld id="{00000000-1234-1234-1234-123412341234}" type="slidenum">
               <a:rPr lang="en-GB"/>
-              <a:t>‹nr.›</a:t>
+              <a:t>‹#›</a:t>
             </a:fld>
             <a:endParaRPr/>
           </a:p>
@@ -9669,7 +9671,7 @@
             </a:pPr>
             <a:fld id="{00000000-1234-1234-1234-123412341234}" type="slidenum">
               <a:rPr lang="en-GB"/>
-              <a:t>‹nr.›</a:t>
+              <a:t>‹#›</a:t>
             </a:fld>
             <a:endParaRPr/>
           </a:p>
@@ -10529,7 +10531,7 @@
   <p:cSld>
     <p:spTree>
       <p:nvGrpSpPr>
-        <p:cNvPr id="1" name="Shape 152"/>
+        <p:cNvPr id="1" name="Shape 167"/>
         <p:cNvGrpSpPr/>
         <p:nvPr/>
       </p:nvGrpSpPr>
@@ -10543,7 +10545,7 @@
       </p:grpSpPr>
       <p:sp>
         <p:nvSpPr>
-          <p:cNvPr id="153" name="Google Shape;153;p22"/>
+          <p:cNvPr id="168" name="Google Shape;168;p23"/>
           <p:cNvSpPr txBox="1">
             <a:spLocks noGrp="1"/>
           </p:cNvSpPr>
@@ -10576,16 +10578,16 @@
               <a:buNone/>
             </a:pPr>
             <a:r>
-              <a:rPr lang="en-GB" dirty="0"/>
-              <a:t>                                       Broker</a:t>
+              <a:rPr lang="en-GB"/>
+              <a:t>                                        Cluster</a:t>
             </a:r>
-            <a:endParaRPr dirty="0"/>
+            <a:endParaRPr/>
           </a:p>
         </p:txBody>
       </p:sp>
       <p:sp>
         <p:nvSpPr>
-          <p:cNvPr id="154" name="Google Shape;154;p22"/>
+          <p:cNvPr id="169" name="Google Shape;169;p23"/>
           <p:cNvSpPr txBox="1">
             <a:spLocks noGrp="1"/>
           </p:cNvSpPr>
@@ -10618,16 +10620,16 @@
               <a:buNone/>
             </a:pPr>
             <a:r>
-              <a:rPr lang="en-GB"/>
-              <a:t>Kafka server</a:t>
+              <a:rPr lang="en-GB" dirty="0"/>
+              <a:t>A Group of brokers that work together for a common purpose </a:t>
             </a:r>
-            <a:endParaRPr/>
+            <a:endParaRPr dirty="0"/>
           </a:p>
         </p:txBody>
       </p:sp>
       <p:sp>
         <p:nvSpPr>
-          <p:cNvPr id="155" name="Google Shape;155;p22"/>
+          <p:cNvPr id="170" name="Google Shape;170;p23"/>
           <p:cNvSpPr/>
           <p:nvPr/>
         </p:nvSpPr>
@@ -10677,7 +10679,7 @@
       </p:sp>
       <p:sp>
         <p:nvSpPr>
-          <p:cNvPr id="156" name="Google Shape;156;p22"/>
+          <p:cNvPr id="171" name="Google Shape;171;p23"/>
           <p:cNvSpPr/>
           <p:nvPr/>
         </p:nvSpPr>
@@ -10727,7 +10729,7 @@
       </p:sp>
       <p:sp>
         <p:nvSpPr>
-          <p:cNvPr id="157" name="Google Shape;157;p22"/>
+          <p:cNvPr id="172" name="Google Shape;172;p23"/>
           <p:cNvSpPr/>
           <p:nvPr/>
         </p:nvSpPr>
@@ -10768,32 +10770,16 @@
               <a:buNone/>
             </a:pPr>
             <a:r>
-              <a:rPr lang="en-GB" dirty="0"/>
-              <a:t>                Kafka server</a:t>
+              <a:rPr lang="en-GB"/>
+              <a:t>          </a:t>
             </a:r>
-            <a:endParaRPr dirty="0"/>
-          </a:p>
-          <a:p>
-            <a:pPr marL="0" lvl="0" indent="0" algn="l" rtl="0">
-              <a:spcBef>
-                <a:spcPts val="0"/>
-              </a:spcBef>
-              <a:spcAft>
-                <a:spcPts val="0"/>
-              </a:spcAft>
-              <a:buNone/>
-            </a:pPr>
-            <a:r>
-              <a:rPr lang="en-GB" dirty="0"/>
-              <a:t>                  (Broker)</a:t>
-            </a:r>
-            <a:endParaRPr dirty="0"/>
+            <a:endParaRPr/>
           </a:p>
         </p:txBody>
       </p:sp>
       <p:sp>
         <p:nvSpPr>
-          <p:cNvPr id="158" name="Google Shape;158;p22"/>
+          <p:cNvPr id="173" name="Google Shape;173;p23"/>
           <p:cNvSpPr/>
           <p:nvPr/>
         </p:nvSpPr>
@@ -10843,7 +10829,7 @@
       </p:sp>
       <p:sp>
         <p:nvSpPr>
-          <p:cNvPr id="159" name="Google Shape;159;p22"/>
+          <p:cNvPr id="174" name="Google Shape;174;p23"/>
           <p:cNvSpPr/>
           <p:nvPr/>
         </p:nvSpPr>
@@ -10891,162 +10877,24 @@
           </a:p>
         </p:txBody>
       </p:sp>
-      <p:cxnSp>
-        <p:nvCxnSpPr>
-          <p:cNvPr id="160" name="Google Shape;160;p22"/>
-          <p:cNvCxnSpPr>
-            <a:stCxn id="155" idx="3"/>
-          </p:cNvCxnSpPr>
-          <p:nvPr/>
-        </p:nvCxnSpPr>
-        <p:spPr>
-          <a:xfrm>
-            <a:off x="2174825" y="2133825"/>
-            <a:ext cx="1081800" cy="546000"/>
-          </a:xfrm>
-          <a:prstGeom prst="straightConnector1">
+      <p:sp>
+        <p:nvSpPr>
+          <p:cNvPr id="175" name="Google Shape;175;p23"/>
+          <p:cNvSpPr txBox="1"/>
+          <p:nvPr/>
+        </p:nvSpPr>
+        <p:spPr>
+          <a:xfrm>
+            <a:off x="3431650" y="2138325"/>
+            <a:ext cx="1656000" cy="299400"/>
+          </a:xfrm>
+          <a:prstGeom prst="rect">
             <a:avLst/>
           </a:prstGeom>
           <a:noFill/>
-          <a:ln w="9525" cap="flat" cmpd="sng">
-            <a:solidFill>
-              <a:schemeClr val="dk2"/>
-            </a:solidFill>
-            <a:prstDash val="solid"/>
-            <a:round/>
-            <a:headEnd type="none" w="med" len="med"/>
-            <a:tailEnd type="triangle" w="med" len="med"/>
+          <a:ln>
+            <a:noFill/>
           </a:ln>
-        </p:spPr>
-      </p:cxnSp>
-      <p:cxnSp>
-        <p:nvCxnSpPr>
-          <p:cNvPr id="161" name="Google Shape;161;p22"/>
-          <p:cNvCxnSpPr>
-            <a:stCxn id="156" idx="3"/>
-            <a:endCxn id="157" idx="1"/>
-          </p:cNvCxnSpPr>
-          <p:nvPr/>
-        </p:nvCxnSpPr>
-        <p:spPr>
-          <a:xfrm rot="10800000" flipH="1">
-            <a:off x="2129475" y="3057425"/>
-            <a:ext cx="1127100" cy="617100"/>
-          </a:xfrm>
-          <a:prstGeom prst="straightConnector1">
-            <a:avLst/>
-          </a:prstGeom>
-          <a:noFill/>
-          <a:ln w="9525" cap="flat" cmpd="sng">
-            <a:solidFill>
-              <a:schemeClr val="dk2"/>
-            </a:solidFill>
-            <a:prstDash val="solid"/>
-            <a:round/>
-            <a:headEnd type="none" w="med" len="med"/>
-            <a:tailEnd type="triangle" w="med" len="med"/>
-          </a:ln>
-        </p:spPr>
-      </p:cxnSp>
-      <p:cxnSp>
-        <p:nvCxnSpPr>
-          <p:cNvPr id="162" name="Google Shape;162;p22"/>
-          <p:cNvCxnSpPr>
-            <a:endCxn id="158" idx="1"/>
-          </p:cNvCxnSpPr>
-          <p:nvPr/>
-        </p:nvCxnSpPr>
-        <p:spPr>
-          <a:xfrm rot="10800000" flipH="1">
-            <a:off x="5955600" y="2302150"/>
-            <a:ext cx="1078200" cy="297900"/>
-          </a:xfrm>
-          <a:prstGeom prst="straightConnector1">
-            <a:avLst/>
-          </a:prstGeom>
-          <a:noFill/>
-          <a:ln w="9525" cap="flat" cmpd="sng">
-            <a:solidFill>
-              <a:schemeClr val="dk2"/>
-            </a:solidFill>
-            <a:prstDash val="solid"/>
-            <a:round/>
-            <a:headEnd type="none" w="med" len="med"/>
-            <a:tailEnd type="triangle" w="med" len="med"/>
-          </a:ln>
-        </p:spPr>
-      </p:cxnSp>
-      <p:cxnSp>
-        <p:nvCxnSpPr>
-          <p:cNvPr id="163" name="Google Shape;163;p22"/>
-          <p:cNvCxnSpPr>
-            <a:endCxn id="159" idx="1"/>
-          </p:cNvCxnSpPr>
-          <p:nvPr/>
-        </p:nvCxnSpPr>
-        <p:spPr>
-          <a:xfrm>
-            <a:off x="5931850" y="3579375"/>
-            <a:ext cx="1171500" cy="904500"/>
-          </a:xfrm>
-          <a:prstGeom prst="straightConnector1">
-            <a:avLst/>
-          </a:prstGeom>
-          <a:noFill/>
-          <a:ln w="9525" cap="flat" cmpd="sng">
-            <a:solidFill>
-              <a:schemeClr val="dk2"/>
-            </a:solidFill>
-            <a:prstDash val="solid"/>
-            <a:round/>
-            <a:headEnd type="none" w="med" len="med"/>
-            <a:tailEnd type="triangle" w="med" len="med"/>
-          </a:ln>
-        </p:spPr>
-      </p:cxnSp>
-    </p:spTree>
-  </p:cSld>
-  <p:clrMapOvr>
-    <a:masterClrMapping/>
-  </p:clrMapOvr>
-</p:sld>
-</file>
-
-<file path=ppt/slides/slide11.xml><?xml version="1.0" encoding="utf-8"?>
-<p:sld xmlns:a="http://schemas.openxmlformats.org/drawingml/2006/main" xmlns:r="http://schemas.openxmlformats.org/officeDocument/2006/relationships" xmlns:p="http://schemas.openxmlformats.org/presentationml/2006/main">
-  <p:cSld>
-    <p:spTree>
-      <p:nvGrpSpPr>
-        <p:cNvPr id="1" name="Shape 167"/>
-        <p:cNvGrpSpPr/>
-        <p:nvPr/>
-      </p:nvGrpSpPr>
-      <p:grpSpPr>
-        <a:xfrm>
-          <a:off x="0" y="0"/>
-          <a:ext cx="0" cy="0"/>
-          <a:chOff x="0" y="0"/>
-          <a:chExt cx="0" cy="0"/>
-        </a:xfrm>
-      </p:grpSpPr>
-      <p:sp>
-        <p:nvSpPr>
-          <p:cNvPr id="168" name="Google Shape;168;p23"/>
-          <p:cNvSpPr txBox="1">
-            <a:spLocks noGrp="1"/>
-          </p:cNvSpPr>
-          <p:nvPr>
-            <p:ph type="title"/>
-          </p:nvPr>
-        </p:nvSpPr>
-        <p:spPr>
-          <a:xfrm>
-            <a:off x="311700" y="410000"/>
-            <a:ext cx="8520600" cy="607800"/>
-          </a:xfrm>
-          <a:prstGeom prst="rect">
-            <a:avLst/>
-          </a:prstGeom>
         </p:spPr>
         <p:txBody>
           <a:bodyPr spcFirstLastPara="1" wrap="square" lIns="91425" tIns="91425" rIns="91425" bIns="91425" anchor="t" anchorCtr="0">
@@ -11063,166 +10911,25 @@
               </a:spcAft>
               <a:buNone/>
             </a:pPr>
-            <a:r>
-              <a:rPr lang="en-GB"/>
-              <a:t>                                        Cluster</a:t>
-            </a:r>
-            <a:endParaRPr/>
+            <a:endParaRPr>
+              <a:latin typeface="Roboto"/>
+              <a:ea typeface="Roboto"/>
+              <a:cs typeface="Roboto"/>
+              <a:sym typeface="Roboto"/>
+            </a:endParaRPr>
           </a:p>
         </p:txBody>
       </p:sp>
       <p:sp>
         <p:nvSpPr>
-          <p:cNvPr id="169" name="Google Shape;169;p23"/>
-          <p:cNvSpPr txBox="1">
-            <a:spLocks noGrp="1"/>
-          </p:cNvSpPr>
-          <p:nvPr>
-            <p:ph type="body" idx="1"/>
-          </p:nvPr>
-        </p:nvSpPr>
-        <p:spPr>
-          <a:xfrm>
-            <a:off x="311700" y="1229875"/>
-            <a:ext cx="8520600" cy="3339000"/>
-          </a:xfrm>
-          <a:prstGeom prst="rect">
-            <a:avLst/>
-          </a:prstGeom>
-        </p:spPr>
-        <p:txBody>
-          <a:bodyPr spcFirstLastPara="1" wrap="square" lIns="91425" tIns="91425" rIns="91425" bIns="91425" anchor="t" anchorCtr="0">
-            <a:noAutofit/>
-          </a:bodyPr>
-          <a:lstStyle/>
-          <a:p>
-            <a:pPr marL="0" lvl="0" indent="0" algn="l" rtl="0">
-              <a:spcBef>
-                <a:spcPts val="0"/>
-              </a:spcBef>
-              <a:spcAft>
-                <a:spcPts val="1600"/>
-              </a:spcAft>
-              <a:buNone/>
-            </a:pPr>
-            <a:r>
-              <a:rPr lang="en-GB" dirty="0"/>
-              <a:t>A Group of brokers that work together for a common purpose </a:t>
-            </a:r>
-            <a:endParaRPr dirty="0"/>
-          </a:p>
-        </p:txBody>
-      </p:sp>
-      <p:sp>
-        <p:nvSpPr>
-          <p:cNvPr id="170" name="Google Shape;170;p23"/>
+          <p:cNvPr id="176" name="Google Shape;176;p23"/>
           <p:cNvSpPr/>
           <p:nvPr/>
         </p:nvSpPr>
         <p:spPr>
           <a:xfrm>
-            <a:off x="96725" y="1829925"/>
-            <a:ext cx="2078100" cy="607800"/>
-          </a:xfrm>
-          <a:prstGeom prst="rect">
-            <a:avLst/>
-          </a:prstGeom>
-          <a:solidFill>
-            <a:schemeClr val="lt2"/>
-          </a:solidFill>
-          <a:ln w="9525" cap="flat" cmpd="sng">
-            <a:solidFill>
-              <a:schemeClr val="dk2"/>
-            </a:solidFill>
-            <a:prstDash val="solid"/>
-            <a:round/>
-            <a:headEnd type="none" w="sm" len="sm"/>
-            <a:tailEnd type="none" w="sm" len="sm"/>
-          </a:ln>
-        </p:spPr>
-        <p:txBody>
-          <a:bodyPr spcFirstLastPara="1" wrap="square" lIns="91425" tIns="91425" rIns="91425" bIns="91425" anchor="ctr" anchorCtr="0">
-            <a:noAutofit/>
-          </a:bodyPr>
-          <a:lstStyle/>
-          <a:p>
-            <a:pPr marL="0" lvl="0" indent="0" algn="l" rtl="0">
-              <a:spcBef>
-                <a:spcPts val="0"/>
-              </a:spcBef>
-              <a:spcAft>
-                <a:spcPts val="0"/>
-              </a:spcAft>
-              <a:buNone/>
-            </a:pPr>
-            <a:r>
-              <a:rPr lang="en-GB" dirty="0"/>
-              <a:t>Producer 1</a:t>
-            </a:r>
-            <a:endParaRPr dirty="0"/>
-          </a:p>
-        </p:txBody>
-      </p:sp>
-      <p:sp>
-        <p:nvSpPr>
-          <p:cNvPr id="171" name="Google Shape;171;p23"/>
-          <p:cNvSpPr/>
-          <p:nvPr/>
-        </p:nvSpPr>
-        <p:spPr>
-          <a:xfrm>
-            <a:off x="51375" y="3370625"/>
-            <a:ext cx="2078100" cy="607800"/>
-          </a:xfrm>
-          <a:prstGeom prst="rect">
-            <a:avLst/>
-          </a:prstGeom>
-          <a:solidFill>
-            <a:schemeClr val="lt2"/>
-          </a:solidFill>
-          <a:ln w="9525" cap="flat" cmpd="sng">
-            <a:solidFill>
-              <a:schemeClr val="dk2"/>
-            </a:solidFill>
-            <a:prstDash val="solid"/>
-            <a:round/>
-            <a:headEnd type="none" w="sm" len="sm"/>
-            <a:tailEnd type="none" w="sm" len="sm"/>
-          </a:ln>
-        </p:spPr>
-        <p:txBody>
-          <a:bodyPr spcFirstLastPara="1" wrap="square" lIns="91425" tIns="91425" rIns="91425" bIns="91425" anchor="ctr" anchorCtr="0">
-            <a:noAutofit/>
-          </a:bodyPr>
-          <a:lstStyle/>
-          <a:p>
-            <a:pPr marL="0" lvl="0" indent="0" algn="l" rtl="0">
-              <a:spcBef>
-                <a:spcPts val="0"/>
-              </a:spcBef>
-              <a:spcAft>
-                <a:spcPts val="0"/>
-              </a:spcAft>
-              <a:buNone/>
-            </a:pPr>
-            <a:r>
-              <a:rPr lang="en-GB" dirty="0"/>
-              <a:t>Producer 2</a:t>
-            </a:r>
-            <a:endParaRPr dirty="0"/>
-          </a:p>
-        </p:txBody>
-      </p:sp>
-      <p:sp>
-        <p:nvSpPr>
-          <p:cNvPr id="172" name="Google Shape;172;p23"/>
-          <p:cNvSpPr/>
-          <p:nvPr/>
-        </p:nvSpPr>
-        <p:spPr>
-          <a:xfrm>
-            <a:off x="3256500" y="1934775"/>
-            <a:ext cx="2683200" cy="2245200"/>
+            <a:off x="3391900" y="2169363"/>
+            <a:ext cx="1735500" cy="371100"/>
           </a:xfrm>
           <a:prstGeom prst="rect">
             <a:avLst/>
@@ -11257,7 +10964,7 @@
             </a:pPr>
             <a:r>
               <a:rPr lang="en-GB"/>
-              <a:t>          </a:t>
+              <a:t>Broker 1</a:t>
             </a:r>
             <a:endParaRPr/>
           </a:p>
@@ -11265,156 +10972,13 @@
       </p:sp>
       <p:sp>
         <p:nvSpPr>
-          <p:cNvPr id="173" name="Google Shape;173;p23"/>
+          <p:cNvPr id="177" name="Google Shape;177;p23"/>
           <p:cNvSpPr/>
           <p:nvPr/>
         </p:nvSpPr>
         <p:spPr>
           <a:xfrm>
-            <a:off x="7033800" y="1998250"/>
-            <a:ext cx="2078100" cy="607800"/>
-          </a:xfrm>
-          <a:prstGeom prst="rect">
-            <a:avLst/>
-          </a:prstGeom>
-          <a:solidFill>
-            <a:schemeClr val="lt2"/>
-          </a:solidFill>
-          <a:ln w="9525" cap="flat" cmpd="sng">
-            <a:solidFill>
-              <a:schemeClr val="dk2"/>
-            </a:solidFill>
-            <a:prstDash val="solid"/>
-            <a:round/>
-            <a:headEnd type="none" w="sm" len="sm"/>
-            <a:tailEnd type="none" w="sm" len="sm"/>
-          </a:ln>
-        </p:spPr>
-        <p:txBody>
-          <a:bodyPr spcFirstLastPara="1" wrap="square" lIns="91425" tIns="91425" rIns="91425" bIns="91425" anchor="ctr" anchorCtr="0">
-            <a:noAutofit/>
-          </a:bodyPr>
-          <a:lstStyle/>
-          <a:p>
-            <a:pPr marL="0" lvl="0" indent="0" algn="l" rtl="0">
-              <a:spcBef>
-                <a:spcPts val="0"/>
-              </a:spcBef>
-              <a:spcAft>
-                <a:spcPts val="0"/>
-              </a:spcAft>
-              <a:buNone/>
-            </a:pPr>
-            <a:r>
-              <a:rPr lang="en-GB"/>
-              <a:t>Consumer 1</a:t>
-            </a:r>
-            <a:endParaRPr/>
-          </a:p>
-        </p:txBody>
-      </p:sp>
-      <p:sp>
-        <p:nvSpPr>
-          <p:cNvPr id="174" name="Google Shape;174;p23"/>
-          <p:cNvSpPr/>
-          <p:nvPr/>
-        </p:nvSpPr>
-        <p:spPr>
-          <a:xfrm>
-            <a:off x="7103350" y="4179975"/>
-            <a:ext cx="2078100" cy="607800"/>
-          </a:xfrm>
-          <a:prstGeom prst="rect">
-            <a:avLst/>
-          </a:prstGeom>
-          <a:solidFill>
-            <a:schemeClr val="lt2"/>
-          </a:solidFill>
-          <a:ln w="9525" cap="flat" cmpd="sng">
-            <a:solidFill>
-              <a:schemeClr val="dk2"/>
-            </a:solidFill>
-            <a:prstDash val="solid"/>
-            <a:round/>
-            <a:headEnd type="none" w="sm" len="sm"/>
-            <a:tailEnd type="none" w="sm" len="sm"/>
-          </a:ln>
-        </p:spPr>
-        <p:txBody>
-          <a:bodyPr spcFirstLastPara="1" wrap="square" lIns="91425" tIns="91425" rIns="91425" bIns="91425" anchor="ctr" anchorCtr="0">
-            <a:noAutofit/>
-          </a:bodyPr>
-          <a:lstStyle/>
-          <a:p>
-            <a:pPr marL="0" lvl="0" indent="0" algn="l" rtl="0">
-              <a:spcBef>
-                <a:spcPts val="0"/>
-              </a:spcBef>
-              <a:spcAft>
-                <a:spcPts val="0"/>
-              </a:spcAft>
-              <a:buNone/>
-            </a:pPr>
-            <a:r>
-              <a:rPr lang="en-GB"/>
-              <a:t>Consumer 2</a:t>
-            </a:r>
-            <a:endParaRPr/>
-          </a:p>
-        </p:txBody>
-      </p:sp>
-      <p:sp>
-        <p:nvSpPr>
-          <p:cNvPr id="175" name="Google Shape;175;p23"/>
-          <p:cNvSpPr txBox="1"/>
-          <p:nvPr/>
-        </p:nvSpPr>
-        <p:spPr>
-          <a:xfrm>
-            <a:off x="3431650" y="2138325"/>
-            <a:ext cx="1656000" cy="299400"/>
-          </a:xfrm>
-          <a:prstGeom prst="rect">
-            <a:avLst/>
-          </a:prstGeom>
-          <a:noFill/>
-          <a:ln>
-            <a:noFill/>
-          </a:ln>
-        </p:spPr>
-        <p:txBody>
-          <a:bodyPr spcFirstLastPara="1" wrap="square" lIns="91425" tIns="91425" rIns="91425" bIns="91425" anchor="t" anchorCtr="0">
-            <a:noAutofit/>
-          </a:bodyPr>
-          <a:lstStyle/>
-          <a:p>
-            <a:pPr marL="0" lvl="0" indent="0" algn="l" rtl="0">
-              <a:spcBef>
-                <a:spcPts val="0"/>
-              </a:spcBef>
-              <a:spcAft>
-                <a:spcPts val="0"/>
-              </a:spcAft>
-              <a:buNone/>
-            </a:pPr>
-            <a:endParaRPr>
-              <a:latin typeface="Roboto"/>
-              <a:ea typeface="Roboto"/>
-              <a:cs typeface="Roboto"/>
-              <a:sym typeface="Roboto"/>
-            </a:endParaRPr>
-          </a:p>
-        </p:txBody>
-      </p:sp>
-      <p:sp>
-        <p:nvSpPr>
-          <p:cNvPr id="176" name="Google Shape;176;p23"/>
-          <p:cNvSpPr/>
-          <p:nvPr/>
-        </p:nvSpPr>
-        <p:spPr>
-          <a:xfrm>
-            <a:off x="3391900" y="2169363"/>
+            <a:off x="3391900" y="3786975"/>
             <a:ext cx="1735500" cy="371100"/>
           </a:xfrm>
           <a:prstGeom prst="rect">
@@ -11450,7 +11014,7 @@
             </a:pPr>
             <a:r>
               <a:rPr lang="en-GB"/>
-              <a:t>Broker 1</a:t>
+              <a:t>Broker 4</a:t>
             </a:r>
             <a:endParaRPr/>
           </a:p>
@@ -11458,13 +11022,13 @@
       </p:sp>
       <p:sp>
         <p:nvSpPr>
-          <p:cNvPr id="177" name="Google Shape;177;p23"/>
+          <p:cNvPr id="178" name="Google Shape;178;p23"/>
           <p:cNvSpPr/>
           <p:nvPr/>
         </p:nvSpPr>
         <p:spPr>
           <a:xfrm>
-            <a:off x="3391900" y="3786975"/>
+            <a:off x="3391900" y="2741675"/>
             <a:ext cx="1735500" cy="371100"/>
           </a:xfrm>
           <a:prstGeom prst="rect">
@@ -11500,7 +11064,7 @@
             </a:pPr>
             <a:r>
               <a:rPr lang="en-GB"/>
-              <a:t>Broker 4</a:t>
+              <a:t>Broker 2</a:t>
             </a:r>
             <a:endParaRPr/>
           </a:p>
@@ -11508,13 +11072,13 @@
       </p:sp>
       <p:sp>
         <p:nvSpPr>
-          <p:cNvPr id="178" name="Google Shape;178;p23"/>
+          <p:cNvPr id="179" name="Google Shape;179;p23"/>
           <p:cNvSpPr/>
           <p:nvPr/>
         </p:nvSpPr>
         <p:spPr>
           <a:xfrm>
-            <a:off x="3391900" y="2741675"/>
+            <a:off x="3391900" y="3264325"/>
             <a:ext cx="1735500" cy="371100"/>
           </a:xfrm>
           <a:prstGeom prst="rect">
@@ -11550,56 +11114,6 @@
             </a:pPr>
             <a:r>
               <a:rPr lang="en-GB"/>
-              <a:t>Broker 2</a:t>
-            </a:r>
-            <a:endParaRPr/>
-          </a:p>
-        </p:txBody>
-      </p:sp>
-      <p:sp>
-        <p:nvSpPr>
-          <p:cNvPr id="179" name="Google Shape;179;p23"/>
-          <p:cNvSpPr/>
-          <p:nvPr/>
-        </p:nvSpPr>
-        <p:spPr>
-          <a:xfrm>
-            <a:off x="3391900" y="3264325"/>
-            <a:ext cx="1735500" cy="371100"/>
-          </a:xfrm>
-          <a:prstGeom prst="rect">
-            <a:avLst/>
-          </a:prstGeom>
-          <a:solidFill>
-            <a:schemeClr val="lt2"/>
-          </a:solidFill>
-          <a:ln w="9525" cap="flat" cmpd="sng">
-            <a:solidFill>
-              <a:schemeClr val="dk2"/>
-            </a:solidFill>
-            <a:prstDash val="dash"/>
-            <a:round/>
-            <a:headEnd type="none" w="sm" len="sm"/>
-            <a:tailEnd type="none" w="sm" len="sm"/>
-          </a:ln>
-        </p:spPr>
-        <p:txBody>
-          <a:bodyPr spcFirstLastPara="1" wrap="square" lIns="91425" tIns="91425" rIns="91425" bIns="91425" anchor="ctr" anchorCtr="0">
-            <a:noAutofit/>
-          </a:bodyPr>
-          <a:lstStyle/>
-          <a:p>
-            <a:pPr marL="0" lvl="0" indent="0" algn="l" rtl="0">
-              <a:spcBef>
-                <a:spcPts val="0"/>
-              </a:spcBef>
-              <a:spcAft>
-                <a:spcPts val="0"/>
-              </a:spcAft>
-              <a:buNone/>
-            </a:pPr>
-            <a:r>
-              <a:rPr lang="en-GB"/>
               <a:t>Broker 3</a:t>
             </a:r>
             <a:endParaRPr/>
@@ -11726,7 +11240,7 @@
 </p:sld>
 </file>
 
-<file path=ppt/slides/slide12.xml><?xml version="1.0" encoding="utf-8"?>
+<file path=ppt/slides/slide11.xml><?xml version="1.0" encoding="utf-8"?>
 <p:sld xmlns:a="http://schemas.openxmlformats.org/drawingml/2006/main" xmlns:r="http://schemas.openxmlformats.org/officeDocument/2006/relationships" xmlns:p="http://schemas.openxmlformats.org/presentationml/2006/main">
   <p:cSld>
     <p:spTree>
@@ -12146,7 +11660,7 @@
 </p:sld>
 </file>
 
-<file path=ppt/slides/slide13.xml><?xml version="1.0" encoding="utf-8"?>
+<file path=ppt/slides/slide12.xml><?xml version="1.0" encoding="utf-8"?>
 <p:sld xmlns:a="http://schemas.openxmlformats.org/drawingml/2006/main" xmlns:r="http://schemas.openxmlformats.org/officeDocument/2006/relationships" xmlns:p="http://schemas.openxmlformats.org/presentationml/2006/main">
   <p:cSld>
     <p:spTree>
@@ -12554,7 +12068,7 @@
 </p:sld>
 </file>
 
-<file path=ppt/slides/slide14.xml><?xml version="1.0" encoding="utf-8"?>
+<file path=ppt/slides/slide13.xml><?xml version="1.0" encoding="utf-8"?>
 <p:sld xmlns:a="http://schemas.openxmlformats.org/drawingml/2006/main" xmlns:r="http://schemas.openxmlformats.org/officeDocument/2006/relationships" xmlns:p="http://schemas.openxmlformats.org/presentationml/2006/main">
   <p:cSld>
     <p:spTree>
@@ -12962,7 +12476,7 @@
 </p:sld>
 </file>
 
-<file path=ppt/slides/slide15.xml><?xml version="1.0" encoding="utf-8"?>
+<file path=ppt/slides/slide14.xml><?xml version="1.0" encoding="utf-8"?>
 <p:sld xmlns:a="http://schemas.openxmlformats.org/drawingml/2006/main" xmlns:r="http://schemas.openxmlformats.org/officeDocument/2006/relationships" xmlns:p="http://schemas.openxmlformats.org/presentationml/2006/main">
   <p:cSld>
     <p:spTree>
@@ -13603,7 +13117,7 @@
 </p:sld>
 </file>
 
-<file path=ppt/slides/slide16.xml><?xml version="1.0" encoding="utf-8"?>
+<file path=ppt/slides/slide15.xml><?xml version="1.0" encoding="utf-8"?>
 <p:sld xmlns:a="http://schemas.openxmlformats.org/drawingml/2006/main" xmlns:r="http://schemas.openxmlformats.org/officeDocument/2006/relationships" xmlns:p="http://schemas.openxmlformats.org/presentationml/2006/main">
   <p:cSld>
     <p:spTree>
@@ -13736,7 +13250,7 @@
 </p:sld>
 </file>
 
-<file path=ppt/slides/slide17.xml><?xml version="1.0" encoding="utf-8"?>
+<file path=ppt/slides/slide16.xml><?xml version="1.0" encoding="utf-8"?>
 <p:sld xmlns:a="http://schemas.openxmlformats.org/drawingml/2006/main" xmlns:r="http://schemas.openxmlformats.org/officeDocument/2006/relationships" xmlns:p="http://schemas.openxmlformats.org/presentationml/2006/main">
   <p:cSld>
     <p:spTree>
@@ -14850,7 +14364,7 @@
 </p:sld>
 </file>
 
-<file path=ppt/slides/slide18.xml><?xml version="1.0" encoding="utf-8"?>
+<file path=ppt/slides/slide17.xml><?xml version="1.0" encoding="utf-8"?>
 <p:sld xmlns:a="http://schemas.openxmlformats.org/drawingml/2006/main" xmlns:r="http://schemas.openxmlformats.org/officeDocument/2006/relationships" xmlns:p="http://schemas.openxmlformats.org/presentationml/2006/main">
   <p:cSld>
     <p:spTree>
@@ -15089,7 +14603,7 @@
 </p:sld>
 </file>
 
-<file path=ppt/slides/slide19.xml><?xml version="1.0" encoding="utf-8"?>
+<file path=ppt/slides/slide18.xml><?xml version="1.0" encoding="utf-8"?>
 <p:sld xmlns:a="http://schemas.openxmlformats.org/drawingml/2006/main" xmlns:r="http://schemas.openxmlformats.org/officeDocument/2006/relationships" xmlns:p="http://schemas.openxmlformats.org/presentationml/2006/main">
   <p:cSld>
     <p:spTree>
@@ -15464,6 +14978,729 @@
           </a:ln>
         </p:spPr>
       </p:cxnSp>
+    </p:spTree>
+  </p:cSld>
+  <p:clrMapOvr>
+    <a:masterClrMapping/>
+  </p:clrMapOvr>
+</p:sld>
+</file>
+
+<file path=ppt/slides/slide19.xml><?xml version="1.0" encoding="utf-8"?>
+<p:sld xmlns:a="http://schemas.openxmlformats.org/drawingml/2006/main" xmlns:r="http://schemas.openxmlformats.org/officeDocument/2006/relationships" xmlns:p="http://schemas.openxmlformats.org/presentationml/2006/main">
+  <p:cSld>
+    <p:spTree>
+      <p:nvGrpSpPr>
+        <p:cNvPr id="1" name="Shape 295"/>
+        <p:cNvGrpSpPr/>
+        <p:nvPr/>
+      </p:nvGrpSpPr>
+      <p:grpSpPr>
+        <a:xfrm>
+          <a:off x="0" y="0"/>
+          <a:ext cx="0" cy="0"/>
+          <a:chOff x="0" y="0"/>
+          <a:chExt cx="0" cy="0"/>
+        </a:xfrm>
+      </p:grpSpPr>
+      <p:pic>
+        <p:nvPicPr>
+          <p:cNvPr id="296" name="Google Shape;296;p32"/>
+          <p:cNvPicPr preferRelativeResize="0"/>
+          <p:nvPr/>
+        </p:nvPicPr>
+        <p:blipFill>
+          <a:blip r:embed="rId3">
+            <a:alphaModFix/>
+          </a:blip>
+          <a:stretch>
+            <a:fillRect/>
+          </a:stretch>
+        </p:blipFill>
+        <p:spPr>
+          <a:xfrm>
+            <a:off x="7328650" y="1683975"/>
+            <a:ext cx="1815351" cy="1954674"/>
+          </a:xfrm>
+          <a:prstGeom prst="rect">
+            <a:avLst/>
+          </a:prstGeom>
+          <a:noFill/>
+          <a:ln>
+            <a:noFill/>
+          </a:ln>
+        </p:spPr>
+      </p:pic>
+      <p:sp>
+        <p:nvSpPr>
+          <p:cNvPr id="297" name="Google Shape;297;p32"/>
+          <p:cNvSpPr txBox="1"/>
+          <p:nvPr/>
+        </p:nvSpPr>
+        <p:spPr>
+          <a:xfrm>
+            <a:off x="7488000" y="1345600"/>
+            <a:ext cx="1656000" cy="286500"/>
+          </a:xfrm>
+          <a:prstGeom prst="rect">
+            <a:avLst/>
+          </a:prstGeom>
+          <a:noFill/>
+          <a:ln>
+            <a:noFill/>
+          </a:ln>
+        </p:spPr>
+        <p:txBody>
+          <a:bodyPr spcFirstLastPara="1" wrap="square" lIns="91425" tIns="91425" rIns="91425" bIns="91425" anchor="t" anchorCtr="0">
+            <a:noAutofit/>
+          </a:bodyPr>
+          <a:lstStyle/>
+          <a:p>
+            <a:pPr marL="0" lvl="0" indent="0" algn="l" rtl="0">
+              <a:spcBef>
+                <a:spcPts val="0"/>
+              </a:spcBef>
+              <a:spcAft>
+                <a:spcPts val="0"/>
+              </a:spcAft>
+              <a:buNone/>
+            </a:pPr>
+            <a:r>
+              <a:rPr lang="en-GB">
+                <a:latin typeface="Roboto"/>
+                <a:ea typeface="Roboto"/>
+                <a:cs typeface="Roboto"/>
+                <a:sym typeface="Roboto"/>
+              </a:rPr>
+              <a:t>Data Center</a:t>
+            </a:r>
+            <a:endParaRPr>
+              <a:latin typeface="Roboto"/>
+              <a:ea typeface="Roboto"/>
+              <a:cs typeface="Roboto"/>
+              <a:sym typeface="Roboto"/>
+            </a:endParaRPr>
+          </a:p>
+        </p:txBody>
+      </p:sp>
+      <p:sp>
+        <p:nvSpPr>
+          <p:cNvPr id="298" name="Google Shape;298;p32"/>
+          <p:cNvSpPr/>
+          <p:nvPr/>
+        </p:nvSpPr>
+        <p:spPr>
+          <a:xfrm>
+            <a:off x="95550" y="939525"/>
+            <a:ext cx="2826600" cy="3813900"/>
+          </a:xfrm>
+          <a:prstGeom prst="rect">
+            <a:avLst/>
+          </a:prstGeom>
+          <a:solidFill>
+            <a:schemeClr val="lt2"/>
+          </a:solidFill>
+          <a:ln w="9525" cap="flat" cmpd="sng">
+            <a:solidFill>
+              <a:schemeClr val="dk2"/>
+            </a:solidFill>
+            <a:prstDash val="solid"/>
+            <a:round/>
+            <a:headEnd type="none" w="sm" len="sm"/>
+            <a:tailEnd type="none" w="sm" len="sm"/>
+          </a:ln>
+        </p:spPr>
+        <p:txBody>
+          <a:bodyPr spcFirstLastPara="1" wrap="square" lIns="91425" tIns="91425" rIns="91425" bIns="91425" anchor="ctr" anchorCtr="0">
+            <a:noAutofit/>
+          </a:bodyPr>
+          <a:lstStyle/>
+          <a:p>
+            <a:pPr marL="0" lvl="0" indent="0" algn="l" rtl="0">
+              <a:spcBef>
+                <a:spcPts val="0"/>
+              </a:spcBef>
+              <a:spcAft>
+                <a:spcPts val="0"/>
+              </a:spcAft>
+              <a:buNone/>
+            </a:pPr>
+            <a:endParaRPr/>
+          </a:p>
+        </p:txBody>
+      </p:sp>
+      <p:pic>
+        <p:nvPicPr>
+          <p:cNvPr id="299" name="Google Shape;299;p32"/>
+          <p:cNvPicPr preferRelativeResize="0"/>
+          <p:nvPr/>
+        </p:nvPicPr>
+        <p:blipFill>
+          <a:blip r:embed="rId4">
+            <a:alphaModFix/>
+          </a:blip>
+          <a:stretch>
+            <a:fillRect/>
+          </a:stretch>
+        </p:blipFill>
+        <p:spPr>
+          <a:xfrm>
+            <a:off x="366275" y="1833262"/>
+            <a:ext cx="1256899" cy="836024"/>
+          </a:xfrm>
+          <a:prstGeom prst="rect">
+            <a:avLst/>
+          </a:prstGeom>
+          <a:noFill/>
+          <a:ln>
+            <a:noFill/>
+          </a:ln>
+        </p:spPr>
+      </p:pic>
+      <p:pic>
+        <p:nvPicPr>
+          <p:cNvPr id="300" name="Google Shape;300;p32"/>
+          <p:cNvPicPr preferRelativeResize="0"/>
+          <p:nvPr/>
+        </p:nvPicPr>
+        <p:blipFill>
+          <a:blip r:embed="rId4">
+            <a:alphaModFix/>
+          </a:blip>
+          <a:stretch>
+            <a:fillRect/>
+          </a:stretch>
+        </p:blipFill>
+        <p:spPr>
+          <a:xfrm>
+            <a:off x="366275" y="2678212"/>
+            <a:ext cx="1256899" cy="836024"/>
+          </a:xfrm>
+          <a:prstGeom prst="rect">
+            <a:avLst/>
+          </a:prstGeom>
+          <a:noFill/>
+          <a:ln>
+            <a:noFill/>
+          </a:ln>
+        </p:spPr>
+      </p:pic>
+      <p:pic>
+        <p:nvPicPr>
+          <p:cNvPr id="301" name="Google Shape;301;p32"/>
+          <p:cNvPicPr preferRelativeResize="0"/>
+          <p:nvPr/>
+        </p:nvPicPr>
+        <p:blipFill>
+          <a:blip r:embed="rId4">
+            <a:alphaModFix/>
+          </a:blip>
+          <a:stretch>
+            <a:fillRect/>
+          </a:stretch>
+        </p:blipFill>
+        <p:spPr>
+          <a:xfrm>
+            <a:off x="366275" y="3459462"/>
+            <a:ext cx="1256899" cy="836024"/>
+          </a:xfrm>
+          <a:prstGeom prst="rect">
+            <a:avLst/>
+          </a:prstGeom>
+          <a:noFill/>
+          <a:ln>
+            <a:noFill/>
+          </a:ln>
+        </p:spPr>
+      </p:pic>
+      <p:sp>
+        <p:nvSpPr>
+          <p:cNvPr id="302" name="Google Shape;302;p32"/>
+          <p:cNvSpPr txBox="1"/>
+          <p:nvPr/>
+        </p:nvSpPr>
+        <p:spPr>
+          <a:xfrm>
+            <a:off x="95550" y="613075"/>
+            <a:ext cx="2014500" cy="366300"/>
+          </a:xfrm>
+          <a:prstGeom prst="rect">
+            <a:avLst/>
+          </a:prstGeom>
+          <a:noFill/>
+          <a:ln>
+            <a:noFill/>
+          </a:ln>
+        </p:spPr>
+        <p:txBody>
+          <a:bodyPr spcFirstLastPara="1" wrap="square" lIns="91425" tIns="91425" rIns="91425" bIns="91425" anchor="t" anchorCtr="0">
+            <a:noAutofit/>
+          </a:bodyPr>
+          <a:lstStyle/>
+          <a:p>
+            <a:pPr marL="0" lvl="0" indent="0" algn="l" rtl="0">
+              <a:spcBef>
+                <a:spcPts val="0"/>
+              </a:spcBef>
+              <a:spcAft>
+                <a:spcPts val="0"/>
+              </a:spcAft>
+              <a:buNone/>
+            </a:pPr>
+            <a:r>
+              <a:rPr lang="en-GB">
+                <a:latin typeface="Roboto"/>
+                <a:ea typeface="Roboto"/>
+                <a:cs typeface="Roboto"/>
+                <a:sym typeface="Roboto"/>
+              </a:rPr>
+              <a:t>Retail Organization</a:t>
+            </a:r>
+            <a:endParaRPr>
+              <a:latin typeface="Roboto"/>
+              <a:ea typeface="Roboto"/>
+              <a:cs typeface="Roboto"/>
+              <a:sym typeface="Roboto"/>
+            </a:endParaRPr>
+          </a:p>
+        </p:txBody>
+      </p:sp>
+      <p:cxnSp>
+        <p:nvCxnSpPr>
+          <p:cNvPr id="303" name="Google Shape;303;p32"/>
+          <p:cNvCxnSpPr/>
+          <p:nvPr/>
+        </p:nvCxnSpPr>
+        <p:spPr>
+          <a:xfrm>
+            <a:off x="2923063" y="2332875"/>
+            <a:ext cx="1241100" cy="429900"/>
+          </a:xfrm>
+          <a:prstGeom prst="straightConnector1">
+            <a:avLst/>
+          </a:prstGeom>
+          <a:noFill/>
+          <a:ln w="9525" cap="flat" cmpd="sng">
+            <a:solidFill>
+              <a:schemeClr val="dk2"/>
+            </a:solidFill>
+            <a:prstDash val="solid"/>
+            <a:round/>
+            <a:headEnd type="none" w="med" len="med"/>
+            <a:tailEnd type="triangle" w="med" len="med"/>
+          </a:ln>
+        </p:spPr>
+      </p:cxnSp>
+      <p:sp>
+        <p:nvSpPr>
+          <p:cNvPr id="304" name="Google Shape;304;p32"/>
+          <p:cNvSpPr/>
+          <p:nvPr/>
+        </p:nvSpPr>
+        <p:spPr>
+          <a:xfrm>
+            <a:off x="1695925" y="2022375"/>
+            <a:ext cx="1154400" cy="493800"/>
+          </a:xfrm>
+          <a:prstGeom prst="rect">
+            <a:avLst/>
+          </a:prstGeom>
+          <a:solidFill>
+            <a:schemeClr val="lt2"/>
+          </a:solidFill>
+          <a:ln w="9525" cap="flat" cmpd="sng">
+            <a:solidFill>
+              <a:schemeClr val="dk2"/>
+            </a:solidFill>
+            <a:prstDash val="solid"/>
+            <a:round/>
+            <a:headEnd type="none" w="sm" len="sm"/>
+            <a:tailEnd type="none" w="sm" len="sm"/>
+          </a:ln>
+        </p:spPr>
+        <p:txBody>
+          <a:bodyPr spcFirstLastPara="1" wrap="square" lIns="91425" tIns="91425" rIns="91425" bIns="91425" anchor="ctr" anchorCtr="0">
+            <a:noAutofit/>
+          </a:bodyPr>
+          <a:lstStyle/>
+          <a:p>
+            <a:pPr marL="0" lvl="0" indent="0" algn="l" rtl="0">
+              <a:spcBef>
+                <a:spcPts val="0"/>
+              </a:spcBef>
+              <a:spcAft>
+                <a:spcPts val="0"/>
+              </a:spcAft>
+              <a:buNone/>
+            </a:pPr>
+            <a:r>
+              <a:rPr lang="en-GB" dirty="0"/>
+              <a:t>Producer 2</a:t>
+            </a:r>
+            <a:endParaRPr dirty="0"/>
+          </a:p>
+        </p:txBody>
+      </p:sp>
+      <p:sp>
+        <p:nvSpPr>
+          <p:cNvPr id="305" name="Google Shape;305;p32"/>
+          <p:cNvSpPr/>
+          <p:nvPr/>
+        </p:nvSpPr>
+        <p:spPr>
+          <a:xfrm>
+            <a:off x="1695463" y="2790750"/>
+            <a:ext cx="1154400" cy="493800"/>
+          </a:xfrm>
+          <a:prstGeom prst="rect">
+            <a:avLst/>
+          </a:prstGeom>
+          <a:solidFill>
+            <a:schemeClr val="lt2"/>
+          </a:solidFill>
+          <a:ln w="9525" cap="flat" cmpd="sng">
+            <a:solidFill>
+              <a:schemeClr val="dk2"/>
+            </a:solidFill>
+            <a:prstDash val="solid"/>
+            <a:round/>
+            <a:headEnd type="none" w="sm" len="sm"/>
+            <a:tailEnd type="none" w="sm" len="sm"/>
+          </a:ln>
+        </p:spPr>
+        <p:txBody>
+          <a:bodyPr spcFirstLastPara="1" wrap="square" lIns="91425" tIns="91425" rIns="91425" bIns="91425" anchor="ctr" anchorCtr="0">
+            <a:noAutofit/>
+          </a:bodyPr>
+          <a:lstStyle/>
+          <a:p>
+            <a:pPr marL="0" lvl="0" indent="0" algn="l" rtl="0">
+              <a:spcBef>
+                <a:spcPts val="0"/>
+              </a:spcBef>
+              <a:spcAft>
+                <a:spcPts val="0"/>
+              </a:spcAft>
+              <a:buNone/>
+            </a:pPr>
+            <a:r>
+              <a:rPr lang="en-GB" dirty="0"/>
+              <a:t>Producer 3</a:t>
+            </a:r>
+            <a:endParaRPr dirty="0"/>
+          </a:p>
+        </p:txBody>
+      </p:sp>
+      <p:sp>
+        <p:nvSpPr>
+          <p:cNvPr id="306" name="Google Shape;306;p32"/>
+          <p:cNvSpPr/>
+          <p:nvPr/>
+        </p:nvSpPr>
+        <p:spPr>
+          <a:xfrm>
+            <a:off x="1695475" y="3751625"/>
+            <a:ext cx="1154400" cy="493800"/>
+          </a:xfrm>
+          <a:prstGeom prst="rect">
+            <a:avLst/>
+          </a:prstGeom>
+          <a:solidFill>
+            <a:schemeClr val="lt2"/>
+          </a:solidFill>
+          <a:ln w="9525" cap="flat" cmpd="sng">
+            <a:solidFill>
+              <a:schemeClr val="dk2"/>
+            </a:solidFill>
+            <a:prstDash val="solid"/>
+            <a:round/>
+            <a:headEnd type="none" w="sm" len="sm"/>
+            <a:tailEnd type="none" w="sm" len="sm"/>
+          </a:ln>
+        </p:spPr>
+        <p:txBody>
+          <a:bodyPr spcFirstLastPara="1" wrap="square" lIns="91425" tIns="91425" rIns="91425" bIns="91425" anchor="ctr" anchorCtr="0">
+            <a:noAutofit/>
+          </a:bodyPr>
+          <a:lstStyle/>
+          <a:p>
+            <a:pPr marL="0" lvl="0" indent="0" algn="l" rtl="0">
+              <a:spcBef>
+                <a:spcPts val="0"/>
+              </a:spcBef>
+              <a:spcAft>
+                <a:spcPts val="0"/>
+              </a:spcAft>
+              <a:buNone/>
+            </a:pPr>
+            <a:r>
+              <a:rPr lang="en-GB" dirty="0"/>
+              <a:t>Producer 4</a:t>
+            </a:r>
+            <a:endParaRPr dirty="0"/>
+          </a:p>
+        </p:txBody>
+      </p:sp>
+      <p:cxnSp>
+        <p:nvCxnSpPr>
+          <p:cNvPr id="307" name="Google Shape;307;p32"/>
+          <p:cNvCxnSpPr/>
+          <p:nvPr/>
+        </p:nvCxnSpPr>
+        <p:spPr>
+          <a:xfrm rot="10800000" flipH="1">
+            <a:off x="2850313" y="2778875"/>
+            <a:ext cx="1258200" cy="335400"/>
+          </a:xfrm>
+          <a:prstGeom prst="straightConnector1">
+            <a:avLst/>
+          </a:prstGeom>
+          <a:noFill/>
+          <a:ln w="9525" cap="flat" cmpd="sng">
+            <a:solidFill>
+              <a:schemeClr val="dk2"/>
+            </a:solidFill>
+            <a:prstDash val="solid"/>
+            <a:round/>
+            <a:headEnd type="none" w="med" len="med"/>
+            <a:tailEnd type="triangle" w="med" len="med"/>
+          </a:ln>
+        </p:spPr>
+      </p:cxnSp>
+      <p:cxnSp>
+        <p:nvCxnSpPr>
+          <p:cNvPr id="308" name="Google Shape;308;p32"/>
+          <p:cNvCxnSpPr/>
+          <p:nvPr/>
+        </p:nvCxnSpPr>
+        <p:spPr>
+          <a:xfrm rot="10800000" flipH="1">
+            <a:off x="2838625" y="2778875"/>
+            <a:ext cx="1281600" cy="1164300"/>
+          </a:xfrm>
+          <a:prstGeom prst="straightConnector1">
+            <a:avLst/>
+          </a:prstGeom>
+          <a:noFill/>
+          <a:ln w="9525" cap="flat" cmpd="sng">
+            <a:solidFill>
+              <a:schemeClr val="dk2"/>
+            </a:solidFill>
+            <a:prstDash val="solid"/>
+            <a:round/>
+            <a:headEnd type="none" w="med" len="med"/>
+            <a:tailEnd type="triangle" w="med" len="med"/>
+          </a:ln>
+        </p:spPr>
+      </p:cxnSp>
+      <p:pic>
+        <p:nvPicPr>
+          <p:cNvPr id="309" name="Google Shape;309;p32"/>
+          <p:cNvPicPr preferRelativeResize="0"/>
+          <p:nvPr/>
+        </p:nvPicPr>
+        <p:blipFill>
+          <a:blip r:embed="rId5">
+            <a:alphaModFix/>
+          </a:blip>
+          <a:stretch>
+            <a:fillRect/>
+          </a:stretch>
+        </p:blipFill>
+        <p:spPr>
+          <a:xfrm>
+            <a:off x="4165100" y="1417025"/>
+            <a:ext cx="1105800" cy="2724150"/>
+          </a:xfrm>
+          <a:prstGeom prst="rect">
+            <a:avLst/>
+          </a:prstGeom>
+          <a:noFill/>
+          <a:ln>
+            <a:noFill/>
+          </a:ln>
+        </p:spPr>
+      </p:pic>
+      <p:cxnSp>
+        <p:nvCxnSpPr>
+          <p:cNvPr id="310" name="Google Shape;310;p32"/>
+          <p:cNvCxnSpPr/>
+          <p:nvPr/>
+        </p:nvCxnSpPr>
+        <p:spPr>
+          <a:xfrm rot="10800000" flipH="1">
+            <a:off x="5169525" y="2777000"/>
+            <a:ext cx="403800" cy="4200"/>
+          </a:xfrm>
+          <a:prstGeom prst="straightConnector1">
+            <a:avLst/>
+          </a:prstGeom>
+          <a:noFill/>
+          <a:ln w="9525" cap="flat" cmpd="sng">
+            <a:solidFill>
+              <a:schemeClr val="dk2"/>
+            </a:solidFill>
+            <a:prstDash val="solid"/>
+            <a:round/>
+            <a:headEnd type="none" w="med" len="med"/>
+            <a:tailEnd type="triangle" w="med" len="med"/>
+          </a:ln>
+        </p:spPr>
+      </p:cxnSp>
+      <p:sp>
+        <p:nvSpPr>
+          <p:cNvPr id="311" name="Google Shape;311;p32"/>
+          <p:cNvSpPr/>
+          <p:nvPr/>
+        </p:nvSpPr>
+        <p:spPr>
+          <a:xfrm>
+            <a:off x="5651225" y="2599575"/>
+            <a:ext cx="1241100" cy="493800"/>
+          </a:xfrm>
+          <a:prstGeom prst="rect">
+            <a:avLst/>
+          </a:prstGeom>
+          <a:solidFill>
+            <a:schemeClr val="lt2"/>
+          </a:solidFill>
+          <a:ln w="9525" cap="flat" cmpd="sng">
+            <a:solidFill>
+              <a:schemeClr val="dk2"/>
+            </a:solidFill>
+            <a:prstDash val="solid"/>
+            <a:round/>
+            <a:headEnd type="none" w="sm" len="sm"/>
+            <a:tailEnd type="none" w="sm" len="sm"/>
+          </a:ln>
+        </p:spPr>
+        <p:txBody>
+          <a:bodyPr spcFirstLastPara="1" wrap="square" lIns="91425" tIns="91425" rIns="91425" bIns="91425" anchor="ctr" anchorCtr="0">
+            <a:noAutofit/>
+          </a:bodyPr>
+          <a:lstStyle/>
+          <a:p>
+            <a:pPr marL="0" lvl="0" indent="0" algn="l" rtl="0">
+              <a:spcBef>
+                <a:spcPts val="0"/>
+              </a:spcBef>
+              <a:spcAft>
+                <a:spcPts val="0"/>
+              </a:spcAft>
+              <a:buNone/>
+            </a:pPr>
+            <a:r>
+              <a:rPr lang="en-GB"/>
+              <a:t>CONSUMER</a:t>
+            </a:r>
+            <a:endParaRPr/>
+          </a:p>
+        </p:txBody>
+      </p:sp>
+      <p:cxnSp>
+        <p:nvCxnSpPr>
+          <p:cNvPr id="312" name="Google Shape;312;p32"/>
+          <p:cNvCxnSpPr/>
+          <p:nvPr/>
+        </p:nvCxnSpPr>
+        <p:spPr>
+          <a:xfrm rot="10800000" flipH="1">
+            <a:off x="6993975" y="2790750"/>
+            <a:ext cx="403800" cy="4200"/>
+          </a:xfrm>
+          <a:prstGeom prst="straightConnector1">
+            <a:avLst/>
+          </a:prstGeom>
+          <a:noFill/>
+          <a:ln w="9525" cap="flat" cmpd="sng">
+            <a:solidFill>
+              <a:schemeClr val="dk2"/>
+            </a:solidFill>
+            <a:prstDash val="solid"/>
+            <a:round/>
+            <a:headEnd type="none" w="med" len="med"/>
+            <a:tailEnd type="triangle" w="med" len="med"/>
+          </a:ln>
+        </p:spPr>
+      </p:cxnSp>
+      <p:pic>
+        <p:nvPicPr>
+          <p:cNvPr id="313" name="Google Shape;313;p32"/>
+          <p:cNvPicPr preferRelativeResize="0"/>
+          <p:nvPr/>
+        </p:nvPicPr>
+        <p:blipFill>
+          <a:blip r:embed="rId4">
+            <a:alphaModFix/>
+          </a:blip>
+          <a:stretch>
+            <a:fillRect/>
+          </a:stretch>
+        </p:blipFill>
+        <p:spPr>
+          <a:xfrm>
+            <a:off x="366275" y="988312"/>
+            <a:ext cx="1256899" cy="836024"/>
+          </a:xfrm>
+          <a:prstGeom prst="rect">
+            <a:avLst/>
+          </a:prstGeom>
+          <a:noFill/>
+          <a:ln>
+            <a:noFill/>
+          </a:ln>
+        </p:spPr>
+      </p:pic>
+      <p:sp>
+        <p:nvSpPr>
+          <p:cNvPr id="314" name="Google Shape;314;p32"/>
+          <p:cNvSpPr/>
+          <p:nvPr/>
+        </p:nvSpPr>
+        <p:spPr>
+          <a:xfrm>
+            <a:off x="1695475" y="1159413"/>
+            <a:ext cx="1154400" cy="493800"/>
+          </a:xfrm>
+          <a:prstGeom prst="rect">
+            <a:avLst/>
+          </a:prstGeom>
+          <a:solidFill>
+            <a:schemeClr val="lt2"/>
+          </a:solidFill>
+          <a:ln w="9525" cap="flat" cmpd="sng">
+            <a:solidFill>
+              <a:schemeClr val="dk2"/>
+            </a:solidFill>
+            <a:prstDash val="solid"/>
+            <a:round/>
+            <a:headEnd type="none" w="sm" len="sm"/>
+            <a:tailEnd type="none" w="sm" len="sm"/>
+          </a:ln>
+        </p:spPr>
+        <p:txBody>
+          <a:bodyPr spcFirstLastPara="1" wrap="square" lIns="91425" tIns="91425" rIns="91425" bIns="91425" anchor="ctr" anchorCtr="0">
+            <a:noAutofit/>
+          </a:bodyPr>
+          <a:lstStyle/>
+          <a:p>
+            <a:pPr marL="0" lvl="0" indent="0" algn="l" rtl="0">
+              <a:spcBef>
+                <a:spcPts val="0"/>
+              </a:spcBef>
+              <a:spcAft>
+                <a:spcPts val="0"/>
+              </a:spcAft>
+              <a:buNone/>
+            </a:pPr>
+            <a:r>
+              <a:rPr lang="en-GB" dirty="0"/>
+              <a:t>Producer 1</a:t>
+            </a:r>
+            <a:endParaRPr dirty="0"/>
+          </a:p>
+        </p:txBody>
+      </p:sp>
     </p:spTree>
   </p:cSld>
   <p:clrMapOvr>
@@ -15688,7 +15925,7 @@
   <p:cSld>
     <p:spTree>
       <p:nvGrpSpPr>
-        <p:cNvPr id="1" name="Shape 295"/>
+        <p:cNvPr id="1" name="Shape 318"/>
         <p:cNvGrpSpPr/>
         <p:nvPr/>
       </p:nvGrpSpPr>
@@ -15702,7 +15939,7 @@
       </p:grpSpPr>
       <p:pic>
         <p:nvPicPr>
-          <p:cNvPr id="296" name="Google Shape;296;p32"/>
+          <p:cNvPr id="319" name="Google Shape;319;p33"/>
           <p:cNvPicPr preferRelativeResize="0"/>
           <p:nvPr/>
         </p:nvPicPr>
@@ -15730,7 +15967,7 @@
       </p:pic>
       <p:sp>
         <p:nvSpPr>
-          <p:cNvPr id="297" name="Google Shape;297;p32"/>
+          <p:cNvPr id="320" name="Google Shape;320;p33"/>
           <p:cNvSpPr txBox="1"/>
           <p:nvPr/>
         </p:nvSpPr>
@@ -15782,7 +16019,7 @@
       </p:sp>
       <p:sp>
         <p:nvSpPr>
-          <p:cNvPr id="298" name="Google Shape;298;p32"/>
+          <p:cNvPr id="321" name="Google Shape;321;p33"/>
           <p:cNvSpPr/>
           <p:nvPr/>
         </p:nvSpPr>
@@ -15828,7 +16065,7 @@
       </p:sp>
       <p:pic>
         <p:nvPicPr>
-          <p:cNvPr id="299" name="Google Shape;299;p32"/>
+          <p:cNvPr id="322" name="Google Shape;322;p33"/>
           <p:cNvPicPr preferRelativeResize="0"/>
           <p:nvPr/>
         </p:nvPicPr>
@@ -15856,7 +16093,7 @@
       </p:pic>
       <p:pic>
         <p:nvPicPr>
-          <p:cNvPr id="300" name="Google Shape;300;p32"/>
+          <p:cNvPr id="323" name="Google Shape;323;p33"/>
           <p:cNvPicPr preferRelativeResize="0"/>
           <p:nvPr/>
         </p:nvPicPr>
@@ -15884,7 +16121,7 @@
       </p:pic>
       <p:pic>
         <p:nvPicPr>
-          <p:cNvPr id="301" name="Google Shape;301;p32"/>
+          <p:cNvPr id="324" name="Google Shape;324;p33"/>
           <p:cNvPicPr preferRelativeResize="0"/>
           <p:nvPr/>
         </p:nvPicPr>
@@ -15912,7 +16149,7 @@
       </p:pic>
       <p:sp>
         <p:nvSpPr>
-          <p:cNvPr id="302" name="Google Shape;302;p32"/>
+          <p:cNvPr id="325" name="Google Shape;325;p33"/>
           <p:cNvSpPr txBox="1"/>
           <p:nvPr/>
         </p:nvSpPr>
@@ -15964,729 +16201,6 @@
       </p:sp>
       <p:cxnSp>
         <p:nvCxnSpPr>
-          <p:cNvPr id="303" name="Google Shape;303;p32"/>
-          <p:cNvCxnSpPr/>
-          <p:nvPr/>
-        </p:nvCxnSpPr>
-        <p:spPr>
-          <a:xfrm>
-            <a:off x="2923063" y="2332875"/>
-            <a:ext cx="1241100" cy="429900"/>
-          </a:xfrm>
-          <a:prstGeom prst="straightConnector1">
-            <a:avLst/>
-          </a:prstGeom>
-          <a:noFill/>
-          <a:ln w="9525" cap="flat" cmpd="sng">
-            <a:solidFill>
-              <a:schemeClr val="dk2"/>
-            </a:solidFill>
-            <a:prstDash val="solid"/>
-            <a:round/>
-            <a:headEnd type="none" w="med" len="med"/>
-            <a:tailEnd type="triangle" w="med" len="med"/>
-          </a:ln>
-        </p:spPr>
-      </p:cxnSp>
-      <p:sp>
-        <p:nvSpPr>
-          <p:cNvPr id="304" name="Google Shape;304;p32"/>
-          <p:cNvSpPr/>
-          <p:nvPr/>
-        </p:nvSpPr>
-        <p:spPr>
-          <a:xfrm>
-            <a:off x="1695925" y="2022375"/>
-            <a:ext cx="1154400" cy="493800"/>
-          </a:xfrm>
-          <a:prstGeom prst="rect">
-            <a:avLst/>
-          </a:prstGeom>
-          <a:solidFill>
-            <a:schemeClr val="lt2"/>
-          </a:solidFill>
-          <a:ln w="9525" cap="flat" cmpd="sng">
-            <a:solidFill>
-              <a:schemeClr val="dk2"/>
-            </a:solidFill>
-            <a:prstDash val="solid"/>
-            <a:round/>
-            <a:headEnd type="none" w="sm" len="sm"/>
-            <a:tailEnd type="none" w="sm" len="sm"/>
-          </a:ln>
-        </p:spPr>
-        <p:txBody>
-          <a:bodyPr spcFirstLastPara="1" wrap="square" lIns="91425" tIns="91425" rIns="91425" bIns="91425" anchor="ctr" anchorCtr="0">
-            <a:noAutofit/>
-          </a:bodyPr>
-          <a:lstStyle/>
-          <a:p>
-            <a:pPr marL="0" lvl="0" indent="0" algn="l" rtl="0">
-              <a:spcBef>
-                <a:spcPts val="0"/>
-              </a:spcBef>
-              <a:spcAft>
-                <a:spcPts val="0"/>
-              </a:spcAft>
-              <a:buNone/>
-            </a:pPr>
-            <a:r>
-              <a:rPr lang="en-GB" dirty="0"/>
-              <a:t>Producer 2</a:t>
-            </a:r>
-            <a:endParaRPr dirty="0"/>
-          </a:p>
-        </p:txBody>
-      </p:sp>
-      <p:sp>
-        <p:nvSpPr>
-          <p:cNvPr id="305" name="Google Shape;305;p32"/>
-          <p:cNvSpPr/>
-          <p:nvPr/>
-        </p:nvSpPr>
-        <p:spPr>
-          <a:xfrm>
-            <a:off x="1695463" y="2790750"/>
-            <a:ext cx="1154400" cy="493800"/>
-          </a:xfrm>
-          <a:prstGeom prst="rect">
-            <a:avLst/>
-          </a:prstGeom>
-          <a:solidFill>
-            <a:schemeClr val="lt2"/>
-          </a:solidFill>
-          <a:ln w="9525" cap="flat" cmpd="sng">
-            <a:solidFill>
-              <a:schemeClr val="dk2"/>
-            </a:solidFill>
-            <a:prstDash val="solid"/>
-            <a:round/>
-            <a:headEnd type="none" w="sm" len="sm"/>
-            <a:tailEnd type="none" w="sm" len="sm"/>
-          </a:ln>
-        </p:spPr>
-        <p:txBody>
-          <a:bodyPr spcFirstLastPara="1" wrap="square" lIns="91425" tIns="91425" rIns="91425" bIns="91425" anchor="ctr" anchorCtr="0">
-            <a:noAutofit/>
-          </a:bodyPr>
-          <a:lstStyle/>
-          <a:p>
-            <a:pPr marL="0" lvl="0" indent="0" algn="l" rtl="0">
-              <a:spcBef>
-                <a:spcPts val="0"/>
-              </a:spcBef>
-              <a:spcAft>
-                <a:spcPts val="0"/>
-              </a:spcAft>
-              <a:buNone/>
-            </a:pPr>
-            <a:r>
-              <a:rPr lang="en-GB" dirty="0"/>
-              <a:t>Producer 3</a:t>
-            </a:r>
-            <a:endParaRPr dirty="0"/>
-          </a:p>
-        </p:txBody>
-      </p:sp>
-      <p:sp>
-        <p:nvSpPr>
-          <p:cNvPr id="306" name="Google Shape;306;p32"/>
-          <p:cNvSpPr/>
-          <p:nvPr/>
-        </p:nvSpPr>
-        <p:spPr>
-          <a:xfrm>
-            <a:off x="1695475" y="3751625"/>
-            <a:ext cx="1154400" cy="493800"/>
-          </a:xfrm>
-          <a:prstGeom prst="rect">
-            <a:avLst/>
-          </a:prstGeom>
-          <a:solidFill>
-            <a:schemeClr val="lt2"/>
-          </a:solidFill>
-          <a:ln w="9525" cap="flat" cmpd="sng">
-            <a:solidFill>
-              <a:schemeClr val="dk2"/>
-            </a:solidFill>
-            <a:prstDash val="solid"/>
-            <a:round/>
-            <a:headEnd type="none" w="sm" len="sm"/>
-            <a:tailEnd type="none" w="sm" len="sm"/>
-          </a:ln>
-        </p:spPr>
-        <p:txBody>
-          <a:bodyPr spcFirstLastPara="1" wrap="square" lIns="91425" tIns="91425" rIns="91425" bIns="91425" anchor="ctr" anchorCtr="0">
-            <a:noAutofit/>
-          </a:bodyPr>
-          <a:lstStyle/>
-          <a:p>
-            <a:pPr marL="0" lvl="0" indent="0" algn="l" rtl="0">
-              <a:spcBef>
-                <a:spcPts val="0"/>
-              </a:spcBef>
-              <a:spcAft>
-                <a:spcPts val="0"/>
-              </a:spcAft>
-              <a:buNone/>
-            </a:pPr>
-            <a:r>
-              <a:rPr lang="en-GB" dirty="0"/>
-              <a:t>Producer 4</a:t>
-            </a:r>
-            <a:endParaRPr dirty="0"/>
-          </a:p>
-        </p:txBody>
-      </p:sp>
-      <p:cxnSp>
-        <p:nvCxnSpPr>
-          <p:cNvPr id="307" name="Google Shape;307;p32"/>
-          <p:cNvCxnSpPr/>
-          <p:nvPr/>
-        </p:nvCxnSpPr>
-        <p:spPr>
-          <a:xfrm rot="10800000" flipH="1">
-            <a:off x="2850313" y="2778875"/>
-            <a:ext cx="1258200" cy="335400"/>
-          </a:xfrm>
-          <a:prstGeom prst="straightConnector1">
-            <a:avLst/>
-          </a:prstGeom>
-          <a:noFill/>
-          <a:ln w="9525" cap="flat" cmpd="sng">
-            <a:solidFill>
-              <a:schemeClr val="dk2"/>
-            </a:solidFill>
-            <a:prstDash val="solid"/>
-            <a:round/>
-            <a:headEnd type="none" w="med" len="med"/>
-            <a:tailEnd type="triangle" w="med" len="med"/>
-          </a:ln>
-        </p:spPr>
-      </p:cxnSp>
-      <p:cxnSp>
-        <p:nvCxnSpPr>
-          <p:cNvPr id="308" name="Google Shape;308;p32"/>
-          <p:cNvCxnSpPr/>
-          <p:nvPr/>
-        </p:nvCxnSpPr>
-        <p:spPr>
-          <a:xfrm rot="10800000" flipH="1">
-            <a:off x="2838625" y="2778875"/>
-            <a:ext cx="1281600" cy="1164300"/>
-          </a:xfrm>
-          <a:prstGeom prst="straightConnector1">
-            <a:avLst/>
-          </a:prstGeom>
-          <a:noFill/>
-          <a:ln w="9525" cap="flat" cmpd="sng">
-            <a:solidFill>
-              <a:schemeClr val="dk2"/>
-            </a:solidFill>
-            <a:prstDash val="solid"/>
-            <a:round/>
-            <a:headEnd type="none" w="med" len="med"/>
-            <a:tailEnd type="triangle" w="med" len="med"/>
-          </a:ln>
-        </p:spPr>
-      </p:cxnSp>
-      <p:pic>
-        <p:nvPicPr>
-          <p:cNvPr id="309" name="Google Shape;309;p32"/>
-          <p:cNvPicPr preferRelativeResize="0"/>
-          <p:nvPr/>
-        </p:nvPicPr>
-        <p:blipFill>
-          <a:blip r:embed="rId5">
-            <a:alphaModFix/>
-          </a:blip>
-          <a:stretch>
-            <a:fillRect/>
-          </a:stretch>
-        </p:blipFill>
-        <p:spPr>
-          <a:xfrm>
-            <a:off x="4165100" y="1417025"/>
-            <a:ext cx="1105800" cy="2724150"/>
-          </a:xfrm>
-          <a:prstGeom prst="rect">
-            <a:avLst/>
-          </a:prstGeom>
-          <a:noFill/>
-          <a:ln>
-            <a:noFill/>
-          </a:ln>
-        </p:spPr>
-      </p:pic>
-      <p:cxnSp>
-        <p:nvCxnSpPr>
-          <p:cNvPr id="310" name="Google Shape;310;p32"/>
-          <p:cNvCxnSpPr/>
-          <p:nvPr/>
-        </p:nvCxnSpPr>
-        <p:spPr>
-          <a:xfrm rot="10800000" flipH="1">
-            <a:off x="5169525" y="2777000"/>
-            <a:ext cx="403800" cy="4200"/>
-          </a:xfrm>
-          <a:prstGeom prst="straightConnector1">
-            <a:avLst/>
-          </a:prstGeom>
-          <a:noFill/>
-          <a:ln w="9525" cap="flat" cmpd="sng">
-            <a:solidFill>
-              <a:schemeClr val="dk2"/>
-            </a:solidFill>
-            <a:prstDash val="solid"/>
-            <a:round/>
-            <a:headEnd type="none" w="med" len="med"/>
-            <a:tailEnd type="triangle" w="med" len="med"/>
-          </a:ln>
-        </p:spPr>
-      </p:cxnSp>
-      <p:sp>
-        <p:nvSpPr>
-          <p:cNvPr id="311" name="Google Shape;311;p32"/>
-          <p:cNvSpPr/>
-          <p:nvPr/>
-        </p:nvSpPr>
-        <p:spPr>
-          <a:xfrm>
-            <a:off x="5651225" y="2599575"/>
-            <a:ext cx="1241100" cy="493800"/>
-          </a:xfrm>
-          <a:prstGeom prst="rect">
-            <a:avLst/>
-          </a:prstGeom>
-          <a:solidFill>
-            <a:schemeClr val="lt2"/>
-          </a:solidFill>
-          <a:ln w="9525" cap="flat" cmpd="sng">
-            <a:solidFill>
-              <a:schemeClr val="dk2"/>
-            </a:solidFill>
-            <a:prstDash val="solid"/>
-            <a:round/>
-            <a:headEnd type="none" w="sm" len="sm"/>
-            <a:tailEnd type="none" w="sm" len="sm"/>
-          </a:ln>
-        </p:spPr>
-        <p:txBody>
-          <a:bodyPr spcFirstLastPara="1" wrap="square" lIns="91425" tIns="91425" rIns="91425" bIns="91425" anchor="ctr" anchorCtr="0">
-            <a:noAutofit/>
-          </a:bodyPr>
-          <a:lstStyle/>
-          <a:p>
-            <a:pPr marL="0" lvl="0" indent="0" algn="l" rtl="0">
-              <a:spcBef>
-                <a:spcPts val="0"/>
-              </a:spcBef>
-              <a:spcAft>
-                <a:spcPts val="0"/>
-              </a:spcAft>
-              <a:buNone/>
-            </a:pPr>
-            <a:r>
-              <a:rPr lang="en-GB"/>
-              <a:t>CONSUMER</a:t>
-            </a:r>
-            <a:endParaRPr/>
-          </a:p>
-        </p:txBody>
-      </p:sp>
-      <p:cxnSp>
-        <p:nvCxnSpPr>
-          <p:cNvPr id="312" name="Google Shape;312;p32"/>
-          <p:cNvCxnSpPr/>
-          <p:nvPr/>
-        </p:nvCxnSpPr>
-        <p:spPr>
-          <a:xfrm rot="10800000" flipH="1">
-            <a:off x="6993975" y="2790750"/>
-            <a:ext cx="403800" cy="4200"/>
-          </a:xfrm>
-          <a:prstGeom prst="straightConnector1">
-            <a:avLst/>
-          </a:prstGeom>
-          <a:noFill/>
-          <a:ln w="9525" cap="flat" cmpd="sng">
-            <a:solidFill>
-              <a:schemeClr val="dk2"/>
-            </a:solidFill>
-            <a:prstDash val="solid"/>
-            <a:round/>
-            <a:headEnd type="none" w="med" len="med"/>
-            <a:tailEnd type="triangle" w="med" len="med"/>
-          </a:ln>
-        </p:spPr>
-      </p:cxnSp>
-      <p:pic>
-        <p:nvPicPr>
-          <p:cNvPr id="313" name="Google Shape;313;p32"/>
-          <p:cNvPicPr preferRelativeResize="0"/>
-          <p:nvPr/>
-        </p:nvPicPr>
-        <p:blipFill>
-          <a:blip r:embed="rId4">
-            <a:alphaModFix/>
-          </a:blip>
-          <a:stretch>
-            <a:fillRect/>
-          </a:stretch>
-        </p:blipFill>
-        <p:spPr>
-          <a:xfrm>
-            <a:off x="366275" y="988312"/>
-            <a:ext cx="1256899" cy="836024"/>
-          </a:xfrm>
-          <a:prstGeom prst="rect">
-            <a:avLst/>
-          </a:prstGeom>
-          <a:noFill/>
-          <a:ln>
-            <a:noFill/>
-          </a:ln>
-        </p:spPr>
-      </p:pic>
-      <p:sp>
-        <p:nvSpPr>
-          <p:cNvPr id="314" name="Google Shape;314;p32"/>
-          <p:cNvSpPr/>
-          <p:nvPr/>
-        </p:nvSpPr>
-        <p:spPr>
-          <a:xfrm>
-            <a:off x="1695475" y="1159413"/>
-            <a:ext cx="1154400" cy="493800"/>
-          </a:xfrm>
-          <a:prstGeom prst="rect">
-            <a:avLst/>
-          </a:prstGeom>
-          <a:solidFill>
-            <a:schemeClr val="lt2"/>
-          </a:solidFill>
-          <a:ln w="9525" cap="flat" cmpd="sng">
-            <a:solidFill>
-              <a:schemeClr val="dk2"/>
-            </a:solidFill>
-            <a:prstDash val="solid"/>
-            <a:round/>
-            <a:headEnd type="none" w="sm" len="sm"/>
-            <a:tailEnd type="none" w="sm" len="sm"/>
-          </a:ln>
-        </p:spPr>
-        <p:txBody>
-          <a:bodyPr spcFirstLastPara="1" wrap="square" lIns="91425" tIns="91425" rIns="91425" bIns="91425" anchor="ctr" anchorCtr="0">
-            <a:noAutofit/>
-          </a:bodyPr>
-          <a:lstStyle/>
-          <a:p>
-            <a:pPr marL="0" lvl="0" indent="0" algn="l" rtl="0">
-              <a:spcBef>
-                <a:spcPts val="0"/>
-              </a:spcBef>
-              <a:spcAft>
-                <a:spcPts val="0"/>
-              </a:spcAft>
-              <a:buNone/>
-            </a:pPr>
-            <a:r>
-              <a:rPr lang="en-GB" dirty="0"/>
-              <a:t>Producer 1</a:t>
-            </a:r>
-            <a:endParaRPr dirty="0"/>
-          </a:p>
-        </p:txBody>
-      </p:sp>
-    </p:spTree>
-  </p:cSld>
-  <p:clrMapOvr>
-    <a:masterClrMapping/>
-  </p:clrMapOvr>
-</p:sld>
-</file>
-
-<file path=ppt/slides/slide21.xml><?xml version="1.0" encoding="utf-8"?>
-<p:sld xmlns:a="http://schemas.openxmlformats.org/drawingml/2006/main" xmlns:r="http://schemas.openxmlformats.org/officeDocument/2006/relationships" xmlns:p="http://schemas.openxmlformats.org/presentationml/2006/main">
-  <p:cSld>
-    <p:spTree>
-      <p:nvGrpSpPr>
-        <p:cNvPr id="1" name="Shape 318"/>
-        <p:cNvGrpSpPr/>
-        <p:nvPr/>
-      </p:nvGrpSpPr>
-      <p:grpSpPr>
-        <a:xfrm>
-          <a:off x="0" y="0"/>
-          <a:ext cx="0" cy="0"/>
-          <a:chOff x="0" y="0"/>
-          <a:chExt cx="0" cy="0"/>
-        </a:xfrm>
-      </p:grpSpPr>
-      <p:pic>
-        <p:nvPicPr>
-          <p:cNvPr id="319" name="Google Shape;319;p33"/>
-          <p:cNvPicPr preferRelativeResize="0"/>
-          <p:nvPr/>
-        </p:nvPicPr>
-        <p:blipFill>
-          <a:blip r:embed="rId3">
-            <a:alphaModFix/>
-          </a:blip>
-          <a:stretch>
-            <a:fillRect/>
-          </a:stretch>
-        </p:blipFill>
-        <p:spPr>
-          <a:xfrm>
-            <a:off x="7328650" y="1683975"/>
-            <a:ext cx="1815351" cy="1954674"/>
-          </a:xfrm>
-          <a:prstGeom prst="rect">
-            <a:avLst/>
-          </a:prstGeom>
-          <a:noFill/>
-          <a:ln>
-            <a:noFill/>
-          </a:ln>
-        </p:spPr>
-      </p:pic>
-      <p:sp>
-        <p:nvSpPr>
-          <p:cNvPr id="320" name="Google Shape;320;p33"/>
-          <p:cNvSpPr txBox="1"/>
-          <p:nvPr/>
-        </p:nvSpPr>
-        <p:spPr>
-          <a:xfrm>
-            <a:off x="7488000" y="1345600"/>
-            <a:ext cx="1656000" cy="286500"/>
-          </a:xfrm>
-          <a:prstGeom prst="rect">
-            <a:avLst/>
-          </a:prstGeom>
-          <a:noFill/>
-          <a:ln>
-            <a:noFill/>
-          </a:ln>
-        </p:spPr>
-        <p:txBody>
-          <a:bodyPr spcFirstLastPara="1" wrap="square" lIns="91425" tIns="91425" rIns="91425" bIns="91425" anchor="t" anchorCtr="0">
-            <a:noAutofit/>
-          </a:bodyPr>
-          <a:lstStyle/>
-          <a:p>
-            <a:pPr marL="0" lvl="0" indent="0" algn="l" rtl="0">
-              <a:spcBef>
-                <a:spcPts val="0"/>
-              </a:spcBef>
-              <a:spcAft>
-                <a:spcPts val="0"/>
-              </a:spcAft>
-              <a:buNone/>
-            </a:pPr>
-            <a:r>
-              <a:rPr lang="en-GB">
-                <a:latin typeface="Roboto"/>
-                <a:ea typeface="Roboto"/>
-                <a:cs typeface="Roboto"/>
-                <a:sym typeface="Roboto"/>
-              </a:rPr>
-              <a:t>Data Center</a:t>
-            </a:r>
-            <a:endParaRPr>
-              <a:latin typeface="Roboto"/>
-              <a:ea typeface="Roboto"/>
-              <a:cs typeface="Roboto"/>
-              <a:sym typeface="Roboto"/>
-            </a:endParaRPr>
-          </a:p>
-        </p:txBody>
-      </p:sp>
-      <p:sp>
-        <p:nvSpPr>
-          <p:cNvPr id="321" name="Google Shape;321;p33"/>
-          <p:cNvSpPr/>
-          <p:nvPr/>
-        </p:nvSpPr>
-        <p:spPr>
-          <a:xfrm>
-            <a:off x="95550" y="939525"/>
-            <a:ext cx="2826600" cy="3813900"/>
-          </a:xfrm>
-          <a:prstGeom prst="rect">
-            <a:avLst/>
-          </a:prstGeom>
-          <a:solidFill>
-            <a:schemeClr val="lt2"/>
-          </a:solidFill>
-          <a:ln w="9525" cap="flat" cmpd="sng">
-            <a:solidFill>
-              <a:schemeClr val="dk2"/>
-            </a:solidFill>
-            <a:prstDash val="solid"/>
-            <a:round/>
-            <a:headEnd type="none" w="sm" len="sm"/>
-            <a:tailEnd type="none" w="sm" len="sm"/>
-          </a:ln>
-        </p:spPr>
-        <p:txBody>
-          <a:bodyPr spcFirstLastPara="1" wrap="square" lIns="91425" tIns="91425" rIns="91425" bIns="91425" anchor="ctr" anchorCtr="0">
-            <a:noAutofit/>
-          </a:bodyPr>
-          <a:lstStyle/>
-          <a:p>
-            <a:pPr marL="0" lvl="0" indent="0" algn="l" rtl="0">
-              <a:spcBef>
-                <a:spcPts val="0"/>
-              </a:spcBef>
-              <a:spcAft>
-                <a:spcPts val="0"/>
-              </a:spcAft>
-              <a:buNone/>
-            </a:pPr>
-            <a:endParaRPr/>
-          </a:p>
-        </p:txBody>
-      </p:sp>
-      <p:pic>
-        <p:nvPicPr>
-          <p:cNvPr id="322" name="Google Shape;322;p33"/>
-          <p:cNvPicPr preferRelativeResize="0"/>
-          <p:nvPr/>
-        </p:nvPicPr>
-        <p:blipFill>
-          <a:blip r:embed="rId4">
-            <a:alphaModFix/>
-          </a:blip>
-          <a:stretch>
-            <a:fillRect/>
-          </a:stretch>
-        </p:blipFill>
-        <p:spPr>
-          <a:xfrm>
-            <a:off x="366275" y="1833262"/>
-            <a:ext cx="1256899" cy="836024"/>
-          </a:xfrm>
-          <a:prstGeom prst="rect">
-            <a:avLst/>
-          </a:prstGeom>
-          <a:noFill/>
-          <a:ln>
-            <a:noFill/>
-          </a:ln>
-        </p:spPr>
-      </p:pic>
-      <p:pic>
-        <p:nvPicPr>
-          <p:cNvPr id="323" name="Google Shape;323;p33"/>
-          <p:cNvPicPr preferRelativeResize="0"/>
-          <p:nvPr/>
-        </p:nvPicPr>
-        <p:blipFill>
-          <a:blip r:embed="rId4">
-            <a:alphaModFix/>
-          </a:blip>
-          <a:stretch>
-            <a:fillRect/>
-          </a:stretch>
-        </p:blipFill>
-        <p:spPr>
-          <a:xfrm>
-            <a:off x="366275" y="2678212"/>
-            <a:ext cx="1256899" cy="836024"/>
-          </a:xfrm>
-          <a:prstGeom prst="rect">
-            <a:avLst/>
-          </a:prstGeom>
-          <a:noFill/>
-          <a:ln>
-            <a:noFill/>
-          </a:ln>
-        </p:spPr>
-      </p:pic>
-      <p:pic>
-        <p:nvPicPr>
-          <p:cNvPr id="324" name="Google Shape;324;p33"/>
-          <p:cNvPicPr preferRelativeResize="0"/>
-          <p:nvPr/>
-        </p:nvPicPr>
-        <p:blipFill>
-          <a:blip r:embed="rId4">
-            <a:alphaModFix/>
-          </a:blip>
-          <a:stretch>
-            <a:fillRect/>
-          </a:stretch>
-        </p:blipFill>
-        <p:spPr>
-          <a:xfrm>
-            <a:off x="366275" y="3459462"/>
-            <a:ext cx="1256899" cy="836024"/>
-          </a:xfrm>
-          <a:prstGeom prst="rect">
-            <a:avLst/>
-          </a:prstGeom>
-          <a:noFill/>
-          <a:ln>
-            <a:noFill/>
-          </a:ln>
-        </p:spPr>
-      </p:pic>
-      <p:sp>
-        <p:nvSpPr>
-          <p:cNvPr id="325" name="Google Shape;325;p33"/>
-          <p:cNvSpPr txBox="1"/>
-          <p:nvPr/>
-        </p:nvSpPr>
-        <p:spPr>
-          <a:xfrm>
-            <a:off x="95550" y="613075"/>
-            <a:ext cx="2014500" cy="366300"/>
-          </a:xfrm>
-          <a:prstGeom prst="rect">
-            <a:avLst/>
-          </a:prstGeom>
-          <a:noFill/>
-          <a:ln>
-            <a:noFill/>
-          </a:ln>
-        </p:spPr>
-        <p:txBody>
-          <a:bodyPr spcFirstLastPara="1" wrap="square" lIns="91425" tIns="91425" rIns="91425" bIns="91425" anchor="t" anchorCtr="0">
-            <a:noAutofit/>
-          </a:bodyPr>
-          <a:lstStyle/>
-          <a:p>
-            <a:pPr marL="0" lvl="0" indent="0" algn="l" rtl="0">
-              <a:spcBef>
-                <a:spcPts val="0"/>
-              </a:spcBef>
-              <a:spcAft>
-                <a:spcPts val="0"/>
-              </a:spcAft>
-              <a:buNone/>
-            </a:pPr>
-            <a:r>
-              <a:rPr lang="en-GB">
-                <a:latin typeface="Roboto"/>
-                <a:ea typeface="Roboto"/>
-                <a:cs typeface="Roboto"/>
-                <a:sym typeface="Roboto"/>
-              </a:rPr>
-              <a:t>Retail Organization</a:t>
-            </a:r>
-            <a:endParaRPr>
-              <a:latin typeface="Roboto"/>
-              <a:ea typeface="Roboto"/>
-              <a:cs typeface="Roboto"/>
-              <a:sym typeface="Roboto"/>
-            </a:endParaRPr>
-          </a:p>
-        </p:txBody>
-      </p:sp>
-      <p:cxnSp>
-        <p:nvCxnSpPr>
           <p:cNvPr id="326" name="Google Shape;326;p33"/>
           <p:cNvCxnSpPr/>
           <p:nvPr/>
@@ -17415,7 +16929,7 @@
 </p:sld>
 </file>
 
-<file path=ppt/slides/slide22.xml><?xml version="1.0" encoding="utf-8"?>
+<file path=ppt/slides/slide21.xml><?xml version="1.0" encoding="utf-8"?>
 <p:sld xmlns:a="http://schemas.openxmlformats.org/drawingml/2006/main" xmlns:r="http://schemas.openxmlformats.org/officeDocument/2006/relationships" xmlns:p="http://schemas.openxmlformats.org/presentationml/2006/main">
   <p:cSld>
     <p:spTree>
@@ -18862,7 +18376,7 @@
 </p:sld>
 </file>
 
-<file path=ppt/slides/slide23.xml><?xml version="1.0" encoding="utf-8"?>
+<file path=ppt/slides/slide22.xml><?xml version="1.0" encoding="utf-8"?>
 <p:sld xmlns:a="http://schemas.openxmlformats.org/drawingml/2006/main" xmlns:r="http://schemas.openxmlformats.org/officeDocument/2006/relationships" xmlns:p="http://schemas.openxmlformats.org/presentationml/2006/main">
   <p:cSld>
     <p:spTree>
@@ -19859,7 +19373,7 @@
 </p:sld>
 </file>
 
-<file path=ppt/slides/slide24.xml><?xml version="1.0" encoding="utf-8"?>
+<file path=ppt/slides/slide23.xml><?xml version="1.0" encoding="utf-8"?>
 <p:sld xmlns:a="http://schemas.openxmlformats.org/drawingml/2006/main" xmlns:r="http://schemas.openxmlformats.org/officeDocument/2006/relationships" xmlns:p="http://schemas.openxmlformats.org/presentationml/2006/main">
   <p:cSld>
     <p:spTree>
@@ -19984,7 +19498,7 @@
 </p:sld>
 </file>
 
-<file path=ppt/slides/slide25.xml><?xml version="1.0" encoding="utf-8"?>
+<file path=ppt/slides/slide24.xml><?xml version="1.0" encoding="utf-8"?>
 <p:sld xmlns:a="http://schemas.openxmlformats.org/drawingml/2006/main" xmlns:r="http://schemas.openxmlformats.org/officeDocument/2006/relationships" xmlns:p="http://schemas.openxmlformats.org/presentationml/2006/main">
   <p:cSld>
     <p:spTree>
@@ -21193,7 +20707,7 @@
 </p:sld>
 </file>
 
-<file path=ppt/slides/slide26.xml><?xml version="1.0" encoding="utf-8"?>
+<file path=ppt/slides/slide25.xml><?xml version="1.0" encoding="utf-8"?>
 <p:sld xmlns:a="http://schemas.openxmlformats.org/drawingml/2006/main" xmlns:r="http://schemas.openxmlformats.org/officeDocument/2006/relationships" xmlns:p="http://schemas.openxmlformats.org/presentationml/2006/main">
   <p:cSld>
     <p:spTree>
@@ -21626,7 +21140,7 @@
 </p:sld>
 </file>
 
-<file path=ppt/slides/slide27.xml><?xml version="1.0" encoding="utf-8"?>
+<file path=ppt/slides/slide26.xml><?xml version="1.0" encoding="utf-8"?>
 <p:sld xmlns:a="http://schemas.openxmlformats.org/drawingml/2006/main" xmlns:r="http://schemas.openxmlformats.org/officeDocument/2006/relationships" xmlns:p="http://schemas.openxmlformats.org/presentationml/2006/main">
   <p:cSld>
     <p:spTree>
@@ -21720,7 +21234,576 @@
 </p:sld>
 </file>
 
+<file path=ppt/slides/slide27.xml><?xml version="1.0" encoding="utf-8"?>
+<p:sld xmlns:a="http://schemas.openxmlformats.org/drawingml/2006/main" xmlns:r="http://schemas.openxmlformats.org/officeDocument/2006/relationships" xmlns:p="http://schemas.openxmlformats.org/presentationml/2006/main">
+  <p:cSld>
+    <p:spTree>
+      <p:nvGrpSpPr>
+        <p:cNvPr id="1" name="Shape 102"/>
+        <p:cNvGrpSpPr/>
+        <p:nvPr/>
+      </p:nvGrpSpPr>
+      <p:grpSpPr>
+        <a:xfrm>
+          <a:off x="0" y="0"/>
+          <a:ext cx="0" cy="0"/>
+          <a:chOff x="0" y="0"/>
+          <a:chExt cx="0" cy="0"/>
+        </a:xfrm>
+      </p:grpSpPr>
+      <p:sp>
+        <p:nvSpPr>
+          <p:cNvPr id="103" name="Google Shape;103;p16"/>
+          <p:cNvSpPr txBox="1">
+            <a:spLocks noGrp="1"/>
+          </p:cNvSpPr>
+          <p:nvPr>
+            <p:ph type="title"/>
+          </p:nvPr>
+        </p:nvSpPr>
+        <p:spPr>
+          <a:xfrm>
+            <a:off x="311700" y="410000"/>
+            <a:ext cx="8520600" cy="607800"/>
+          </a:xfrm>
+          <a:prstGeom prst="rect">
+            <a:avLst/>
+          </a:prstGeom>
+        </p:spPr>
+        <p:txBody>
+          <a:bodyPr spcFirstLastPara="1" wrap="square" lIns="91425" tIns="91425" rIns="91425" bIns="91425" anchor="t" anchorCtr="0">
+            <a:noAutofit/>
+          </a:bodyPr>
+          <a:lstStyle/>
+          <a:p>
+            <a:pPr marL="0" lvl="0" indent="0" algn="l" rtl="0">
+              <a:spcBef>
+                <a:spcPts val="0"/>
+              </a:spcBef>
+              <a:spcAft>
+                <a:spcPts val="0"/>
+              </a:spcAft>
+              <a:buNone/>
+            </a:pPr>
+            <a:r>
+              <a:rPr lang="en-GB" dirty="0"/>
+              <a:t>         Streaming system without using Kafka</a:t>
+            </a:r>
+            <a:endParaRPr dirty="0"/>
+          </a:p>
+        </p:txBody>
+      </p:sp>
+      <p:pic>
+        <p:nvPicPr>
+          <p:cNvPr id="5" name="Picture 4" descr="A close up of a map&#10;&#10;Description automatically generated">
+            <a:extLst>
+              <a:ext uri="{FF2B5EF4-FFF2-40B4-BE49-F238E27FC236}">
+                <a16:creationId xmlns:a16="http://schemas.microsoft.com/office/drawing/2014/main" id="{447351AA-B5C1-4D0F-9405-CB3100DFEA2C}"/>
+              </a:ext>
+            </a:extLst>
+          </p:cNvPr>
+          <p:cNvPicPr>
+            <a:picLocks noChangeAspect="1"/>
+          </p:cNvPicPr>
+          <p:nvPr/>
+        </p:nvPicPr>
+        <p:blipFill>
+          <a:blip r:embed="rId3"/>
+          <a:stretch>
+            <a:fillRect/>
+          </a:stretch>
+        </p:blipFill>
+        <p:spPr>
+          <a:xfrm>
+            <a:off x="311700" y="1017800"/>
+            <a:ext cx="8832300" cy="3782800"/>
+          </a:xfrm>
+          <a:prstGeom prst="rect">
+            <a:avLst/>
+          </a:prstGeom>
+        </p:spPr>
+      </p:pic>
+    </p:spTree>
+  </p:cSld>
+  <p:clrMapOvr>
+    <a:masterClrMapping/>
+  </p:clrMapOvr>
+</p:sld>
+</file>
+
 <file path=ppt/slides/slide28.xml><?xml version="1.0" encoding="utf-8"?>
+<p:sld xmlns:a="http://schemas.openxmlformats.org/drawingml/2006/main" xmlns:r="http://schemas.openxmlformats.org/officeDocument/2006/relationships" xmlns:p="http://schemas.openxmlformats.org/presentationml/2006/main">
+  <p:cSld>
+    <p:spTree>
+      <p:nvGrpSpPr>
+        <p:cNvPr id="1" name=""/>
+        <p:cNvGrpSpPr/>
+        <p:nvPr/>
+      </p:nvGrpSpPr>
+      <p:grpSpPr>
+        <a:xfrm>
+          <a:off x="0" y="0"/>
+          <a:ext cx="0" cy="0"/>
+          <a:chOff x="0" y="0"/>
+          <a:chExt cx="0" cy="0"/>
+        </a:xfrm>
+      </p:grpSpPr>
+      <p:sp>
+        <p:nvSpPr>
+          <p:cNvPr id="2" name="Title 1">
+            <a:extLst>
+              <a:ext uri="{FF2B5EF4-FFF2-40B4-BE49-F238E27FC236}">
+                <a16:creationId xmlns:a16="http://schemas.microsoft.com/office/drawing/2014/main" id="{A027F22B-6136-4971-A3D1-71A932B7B6C2}"/>
+              </a:ext>
+            </a:extLst>
+          </p:cNvPr>
+          <p:cNvSpPr>
+            <a:spLocks noGrp="1"/>
+          </p:cNvSpPr>
+          <p:nvPr>
+            <p:ph type="title"/>
+          </p:nvPr>
+        </p:nvSpPr>
+        <p:spPr/>
+        <p:txBody>
+          <a:bodyPr/>
+          <a:lstStyle/>
+          <a:p>
+            <a:r>
+              <a:rPr lang="en-GB" dirty="0"/>
+              <a:t>                           when </a:t>
+            </a:r>
+            <a:r>
+              <a:rPr lang="en-GB" dirty="0" err="1"/>
+              <a:t>kafka</a:t>
+            </a:r>
+            <a:r>
+              <a:rPr lang="en-GB" dirty="0"/>
+              <a:t> is used </a:t>
+            </a:r>
+            <a:endParaRPr lang="en-US" dirty="0"/>
+          </a:p>
+        </p:txBody>
+      </p:sp>
+      <p:pic>
+        <p:nvPicPr>
+          <p:cNvPr id="7" name="Picture 6" descr="A picture containing clock&#10;&#10;Description automatically generated">
+            <a:extLst>
+              <a:ext uri="{FF2B5EF4-FFF2-40B4-BE49-F238E27FC236}">
+                <a16:creationId xmlns:a16="http://schemas.microsoft.com/office/drawing/2014/main" id="{9E590CBA-C5BB-47C8-95F1-C070EB1EC015}"/>
+              </a:ext>
+            </a:extLst>
+          </p:cNvPr>
+          <p:cNvPicPr>
+            <a:picLocks noChangeAspect="1"/>
+          </p:cNvPicPr>
+          <p:nvPr/>
+        </p:nvPicPr>
+        <p:blipFill>
+          <a:blip r:embed="rId2"/>
+          <a:stretch>
+            <a:fillRect/>
+          </a:stretch>
+        </p:blipFill>
+        <p:spPr>
+          <a:xfrm>
+            <a:off x="766482" y="1258980"/>
+            <a:ext cx="7086600" cy="3568513"/>
+          </a:xfrm>
+          <a:prstGeom prst="rect">
+            <a:avLst/>
+          </a:prstGeom>
+        </p:spPr>
+      </p:pic>
+    </p:spTree>
+    <p:extLst>
+      <p:ext uri="{BB962C8B-B14F-4D97-AF65-F5344CB8AC3E}">
+        <p14:creationId xmlns:p14="http://schemas.microsoft.com/office/powerpoint/2010/main" val="2542072048"/>
+      </p:ext>
+    </p:extLst>
+  </p:cSld>
+  <p:clrMapOvr>
+    <a:masterClrMapping/>
+  </p:clrMapOvr>
+</p:sld>
+</file>
+
+<file path=ppt/slides/slide29.xml><?xml version="1.0" encoding="utf-8"?>
+<p:sld xmlns:a="http://schemas.openxmlformats.org/drawingml/2006/main" xmlns:r="http://schemas.openxmlformats.org/officeDocument/2006/relationships" xmlns:p="http://schemas.openxmlformats.org/presentationml/2006/main">
+  <p:cSld>
+    <p:spTree>
+      <p:nvGrpSpPr>
+        <p:cNvPr id="1" name=""/>
+        <p:cNvGrpSpPr/>
+        <p:nvPr/>
+      </p:nvGrpSpPr>
+      <p:grpSpPr>
+        <a:xfrm>
+          <a:off x="0" y="0"/>
+          <a:ext cx="0" cy="0"/>
+          <a:chOff x="0" y="0"/>
+          <a:chExt cx="0" cy="0"/>
+        </a:xfrm>
+      </p:grpSpPr>
+      <p:sp>
+        <p:nvSpPr>
+          <p:cNvPr id="2" name="Title 1">
+            <a:extLst>
+              <a:ext uri="{FF2B5EF4-FFF2-40B4-BE49-F238E27FC236}">
+                <a16:creationId xmlns:a16="http://schemas.microsoft.com/office/drawing/2014/main" id="{7C86BE9D-9823-4599-B6AC-7333754A19AF}"/>
+              </a:ext>
+            </a:extLst>
+          </p:cNvPr>
+          <p:cNvSpPr>
+            <a:spLocks noGrp="1"/>
+          </p:cNvSpPr>
+          <p:nvPr>
+            <p:ph type="title"/>
+          </p:nvPr>
+        </p:nvSpPr>
+        <p:spPr/>
+        <p:txBody>
+          <a:bodyPr/>
+          <a:lstStyle/>
+          <a:p>
+            <a:r>
+              <a:rPr lang="en-GB" dirty="0"/>
+              <a:t>                           who is using </a:t>
+            </a:r>
+            <a:r>
+              <a:rPr lang="en-GB" dirty="0" err="1"/>
+              <a:t>kafka</a:t>
+            </a:r>
+            <a:endParaRPr lang="en-US" dirty="0"/>
+          </a:p>
+        </p:txBody>
+      </p:sp>
+      <p:sp>
+        <p:nvSpPr>
+          <p:cNvPr id="3" name="Text Placeholder 2">
+            <a:extLst>
+              <a:ext uri="{FF2B5EF4-FFF2-40B4-BE49-F238E27FC236}">
+                <a16:creationId xmlns:a16="http://schemas.microsoft.com/office/drawing/2014/main" id="{CFDC38BA-7BAC-4948-B259-58EF2C3F7F2D}"/>
+              </a:ext>
+            </a:extLst>
+          </p:cNvPr>
+          <p:cNvSpPr>
+            <a:spLocks noGrp="1"/>
+          </p:cNvSpPr>
+          <p:nvPr>
+            <p:ph type="body" idx="1"/>
+          </p:nvPr>
+        </p:nvSpPr>
+        <p:spPr/>
+        <p:txBody>
+          <a:bodyPr/>
+          <a:lstStyle/>
+          <a:p>
+            <a:r>
+              <a:rPr lang="en-GB" dirty="0"/>
+              <a:t>Distributed, resilient architecture ,fault tolerant </a:t>
+            </a:r>
+          </a:p>
+          <a:p>
+            <a:r>
+              <a:rPr lang="en-GB" dirty="0"/>
+              <a:t>Horizonal scalability:</a:t>
+            </a:r>
+          </a:p>
+          <a:p>
+            <a:pPr lvl="1"/>
+            <a:r>
+              <a:rPr lang="en-GB" dirty="0"/>
+              <a:t>Can scale to 100s of brokers</a:t>
+            </a:r>
+          </a:p>
+          <a:p>
+            <a:pPr lvl="1"/>
+            <a:r>
+              <a:rPr lang="en-GB" dirty="0"/>
+              <a:t>Can scale to million of messages pre second </a:t>
+            </a:r>
+          </a:p>
+          <a:p>
+            <a:r>
+              <a:rPr lang="en-GB" dirty="0"/>
+              <a:t>High performance (latency of less than 10ms)-real time</a:t>
+            </a:r>
+            <a:endParaRPr lang="en-US" dirty="0"/>
+          </a:p>
+        </p:txBody>
+      </p:sp>
+      <p:pic>
+        <p:nvPicPr>
+          <p:cNvPr id="5" name="Picture 4" descr="A picture containing drawing&#10;&#10;Description automatically generated">
+            <a:extLst>
+              <a:ext uri="{FF2B5EF4-FFF2-40B4-BE49-F238E27FC236}">
+                <a16:creationId xmlns:a16="http://schemas.microsoft.com/office/drawing/2014/main" id="{BBF9FBE3-EA95-4915-BDC9-37BDC6B0459F}"/>
+              </a:ext>
+            </a:extLst>
+          </p:cNvPr>
+          <p:cNvPicPr>
+            <a:picLocks noChangeAspect="1"/>
+          </p:cNvPicPr>
+          <p:nvPr/>
+        </p:nvPicPr>
+        <p:blipFill>
+          <a:blip r:embed="rId2"/>
+          <a:stretch>
+            <a:fillRect/>
+          </a:stretch>
+        </p:blipFill>
+        <p:spPr>
+          <a:xfrm rot="20461468">
+            <a:off x="497486" y="3757903"/>
+            <a:ext cx="1181271" cy="679594"/>
+          </a:xfrm>
+          <a:prstGeom prst="rect">
+            <a:avLst/>
+          </a:prstGeom>
+        </p:spPr>
+      </p:pic>
+      <p:pic>
+        <p:nvPicPr>
+          <p:cNvPr id="7" name="Picture 6" descr="A close up of a logo&#10;&#10;Description automatically generated">
+            <a:extLst>
+              <a:ext uri="{FF2B5EF4-FFF2-40B4-BE49-F238E27FC236}">
+                <a16:creationId xmlns:a16="http://schemas.microsoft.com/office/drawing/2014/main" id="{0ED9E31A-BB84-468F-9296-CFF25A748781}"/>
+              </a:ext>
+            </a:extLst>
+          </p:cNvPr>
+          <p:cNvPicPr>
+            <a:picLocks noChangeAspect="1"/>
+          </p:cNvPicPr>
+          <p:nvPr/>
+        </p:nvPicPr>
+        <p:blipFill>
+          <a:blip r:embed="rId3"/>
+          <a:stretch>
+            <a:fillRect/>
+          </a:stretch>
+        </p:blipFill>
+        <p:spPr>
+          <a:xfrm rot="1134019">
+            <a:off x="2703958" y="3703414"/>
+            <a:ext cx="963322" cy="595445"/>
+          </a:xfrm>
+          <a:prstGeom prst="rect">
+            <a:avLst/>
+          </a:prstGeom>
+        </p:spPr>
+      </p:pic>
+      <p:pic>
+        <p:nvPicPr>
+          <p:cNvPr id="9" name="Picture 8" descr="A picture containing drawing&#10;&#10;Description automatically generated">
+            <a:extLst>
+              <a:ext uri="{FF2B5EF4-FFF2-40B4-BE49-F238E27FC236}">
+                <a16:creationId xmlns:a16="http://schemas.microsoft.com/office/drawing/2014/main" id="{E46DA5C3-196C-4F6A-A533-BD8A568132C1}"/>
+              </a:ext>
+            </a:extLst>
+          </p:cNvPr>
+          <p:cNvPicPr>
+            <a:picLocks noChangeAspect="1"/>
+          </p:cNvPicPr>
+          <p:nvPr/>
+        </p:nvPicPr>
+        <p:blipFill>
+          <a:blip r:embed="rId4"/>
+          <a:stretch>
+            <a:fillRect/>
+          </a:stretch>
+        </p:blipFill>
+        <p:spPr>
+          <a:xfrm>
+            <a:off x="6713937" y="2732637"/>
+            <a:ext cx="1757309" cy="966266"/>
+          </a:xfrm>
+          <a:prstGeom prst="rect">
+            <a:avLst/>
+          </a:prstGeom>
+        </p:spPr>
+      </p:pic>
+      <p:pic>
+        <p:nvPicPr>
+          <p:cNvPr id="11" name="Picture 10" descr="A close up of a blue building&#10;&#10;Description automatically generated">
+            <a:extLst>
+              <a:ext uri="{FF2B5EF4-FFF2-40B4-BE49-F238E27FC236}">
+                <a16:creationId xmlns:a16="http://schemas.microsoft.com/office/drawing/2014/main" id="{2459E9DA-BAB3-4E88-9B39-C814B5A27F21}"/>
+              </a:ext>
+            </a:extLst>
+          </p:cNvPr>
+          <p:cNvPicPr>
+            <a:picLocks noChangeAspect="1"/>
+          </p:cNvPicPr>
+          <p:nvPr/>
+        </p:nvPicPr>
+        <p:blipFill>
+          <a:blip r:embed="rId5"/>
+          <a:stretch>
+            <a:fillRect/>
+          </a:stretch>
+        </p:blipFill>
+        <p:spPr>
+          <a:xfrm>
+            <a:off x="4772951" y="3980733"/>
+            <a:ext cx="1824139" cy="592373"/>
+          </a:xfrm>
+          <a:prstGeom prst="rect">
+            <a:avLst/>
+          </a:prstGeom>
+        </p:spPr>
+      </p:pic>
+    </p:spTree>
+    <p:extLst>
+      <p:ext uri="{BB962C8B-B14F-4D97-AF65-F5344CB8AC3E}">
+        <p14:creationId xmlns:p14="http://schemas.microsoft.com/office/powerpoint/2010/main" val="3672092414"/>
+      </p:ext>
+    </p:extLst>
+  </p:cSld>
+  <p:clrMapOvr>
+    <a:masterClrMapping/>
+  </p:clrMapOvr>
+</p:sld>
+</file>
+
+<file path=ppt/slides/slide3.xml><?xml version="1.0" encoding="utf-8"?>
+<p:sld xmlns:a="http://schemas.openxmlformats.org/drawingml/2006/main" xmlns:r="http://schemas.openxmlformats.org/officeDocument/2006/relationships" xmlns:p="http://schemas.openxmlformats.org/presentationml/2006/main">
+  <p:cSld>
+    <p:spTree>
+      <p:nvGrpSpPr>
+        <p:cNvPr id="1" name="Shape 95"/>
+        <p:cNvGrpSpPr/>
+        <p:nvPr/>
+      </p:nvGrpSpPr>
+      <p:grpSpPr>
+        <a:xfrm>
+          <a:off x="0" y="0"/>
+          <a:ext cx="0" cy="0"/>
+          <a:chOff x="0" y="0"/>
+          <a:chExt cx="0" cy="0"/>
+        </a:xfrm>
+      </p:grpSpPr>
+      <p:sp>
+        <p:nvSpPr>
+          <p:cNvPr id="96" name="Google Shape;96;p15"/>
+          <p:cNvSpPr txBox="1">
+            <a:spLocks noGrp="1"/>
+          </p:cNvSpPr>
+          <p:nvPr>
+            <p:ph type="title"/>
+          </p:nvPr>
+        </p:nvSpPr>
+        <p:spPr>
+          <a:xfrm>
+            <a:off x="311700" y="410000"/>
+            <a:ext cx="8520600" cy="607800"/>
+          </a:xfrm>
+          <a:prstGeom prst="rect">
+            <a:avLst/>
+          </a:prstGeom>
+        </p:spPr>
+        <p:txBody>
+          <a:bodyPr spcFirstLastPara="1" wrap="square" lIns="91425" tIns="91425" rIns="91425" bIns="91425" anchor="t" anchorCtr="0">
+            <a:noAutofit/>
+          </a:bodyPr>
+          <a:lstStyle/>
+          <a:p>
+            <a:pPr marL="0" lvl="0" indent="0" algn="l" rtl="0">
+              <a:spcBef>
+                <a:spcPts val="0"/>
+              </a:spcBef>
+              <a:spcAft>
+                <a:spcPts val="0"/>
+              </a:spcAft>
+              <a:buNone/>
+            </a:pPr>
+            <a:r>
+              <a:rPr lang="en-GB"/>
+              <a:t>What is Kafka</a:t>
+            </a:r>
+            <a:endParaRPr/>
+          </a:p>
+        </p:txBody>
+      </p:sp>
+      <p:sp>
+        <p:nvSpPr>
+          <p:cNvPr id="97" name="Google Shape;97;p15"/>
+          <p:cNvSpPr txBox="1">
+            <a:spLocks noGrp="1"/>
+          </p:cNvSpPr>
+          <p:nvPr>
+            <p:ph type="body" idx="1"/>
+          </p:nvPr>
+        </p:nvSpPr>
+        <p:spPr>
+          <a:xfrm>
+            <a:off x="311700" y="1229875"/>
+            <a:ext cx="8520600" cy="3339000"/>
+          </a:xfrm>
+          <a:prstGeom prst="rect">
+            <a:avLst/>
+          </a:prstGeom>
+        </p:spPr>
+        <p:txBody>
+          <a:bodyPr spcFirstLastPara="1" wrap="square" lIns="91425" tIns="91425" rIns="91425" bIns="91425" anchor="t" anchorCtr="0">
+            <a:noAutofit/>
+          </a:bodyPr>
+          <a:lstStyle/>
+          <a:p>
+            <a:pPr marL="0" lvl="0" indent="0" algn="l" rtl="0">
+              <a:spcBef>
+                <a:spcPts val="0"/>
+              </a:spcBef>
+              <a:spcAft>
+                <a:spcPts val="1600"/>
+              </a:spcAft>
+              <a:buNone/>
+            </a:pPr>
+            <a:r>
+              <a:rPr lang="en-GB"/>
+              <a:t>Distributed streaming platform  </a:t>
+            </a:r>
+            <a:endParaRPr/>
+          </a:p>
+        </p:txBody>
+      </p:sp>
+      <p:pic>
+        <p:nvPicPr>
+          <p:cNvPr id="98" name="Google Shape;98;p15"/>
+          <p:cNvPicPr preferRelativeResize="0"/>
+          <p:nvPr/>
+        </p:nvPicPr>
+        <p:blipFill>
+          <a:blip r:embed="rId3">
+            <a:alphaModFix/>
+          </a:blip>
+          <a:stretch>
+            <a:fillRect/>
+          </a:stretch>
+        </p:blipFill>
+        <p:spPr>
+          <a:xfrm>
+            <a:off x="3826175" y="162875"/>
+            <a:ext cx="5317824" cy="4714202"/>
+          </a:xfrm>
+          <a:prstGeom prst="rect">
+            <a:avLst/>
+          </a:prstGeom>
+          <a:noFill/>
+          <a:ln>
+            <a:noFill/>
+          </a:ln>
+        </p:spPr>
+      </p:pic>
+    </p:spTree>
+  </p:cSld>
+  <p:clrMapOvr>
+    <a:masterClrMapping/>
+  </p:clrMapOvr>
+</p:sld>
+</file>
+
+<file path=ppt/slides/slide30.xml><?xml version="1.0" encoding="utf-8"?>
 <p:sld xmlns:a="http://schemas.openxmlformats.org/drawingml/2006/main" xmlns:r="http://schemas.openxmlformats.org/officeDocument/2006/relationships" xmlns:p="http://schemas.openxmlformats.org/presentationml/2006/main">
   <p:cSld>
     <p:spTree>
@@ -21886,7 +21969,7 @@
 </p:sld>
 </file>
 
-<file path=ppt/slides/slide29.xml><?xml version="1.0" encoding="utf-8"?>
+<file path=ppt/slides/slide31.xml><?xml version="1.0" encoding="utf-8"?>
 <p:sld xmlns:a="http://schemas.openxmlformats.org/drawingml/2006/main" xmlns:r="http://schemas.openxmlformats.org/officeDocument/2006/relationships" xmlns:p="http://schemas.openxmlformats.org/presentationml/2006/main">
   <p:cSld>
     <p:spTree>
@@ -22158,144 +22241,7 @@
 </p:sld>
 </file>
 
-<file path=ppt/slides/slide3.xml><?xml version="1.0" encoding="utf-8"?>
-<p:sld xmlns:a="http://schemas.openxmlformats.org/drawingml/2006/main" xmlns:r="http://schemas.openxmlformats.org/officeDocument/2006/relationships" xmlns:p="http://schemas.openxmlformats.org/presentationml/2006/main">
-  <p:cSld>
-    <p:spTree>
-      <p:nvGrpSpPr>
-        <p:cNvPr id="1" name="Shape 95"/>
-        <p:cNvGrpSpPr/>
-        <p:nvPr/>
-      </p:nvGrpSpPr>
-      <p:grpSpPr>
-        <a:xfrm>
-          <a:off x="0" y="0"/>
-          <a:ext cx="0" cy="0"/>
-          <a:chOff x="0" y="0"/>
-          <a:chExt cx="0" cy="0"/>
-        </a:xfrm>
-      </p:grpSpPr>
-      <p:sp>
-        <p:nvSpPr>
-          <p:cNvPr id="96" name="Google Shape;96;p15"/>
-          <p:cNvSpPr txBox="1">
-            <a:spLocks noGrp="1"/>
-          </p:cNvSpPr>
-          <p:nvPr>
-            <p:ph type="title"/>
-          </p:nvPr>
-        </p:nvSpPr>
-        <p:spPr>
-          <a:xfrm>
-            <a:off x="311700" y="410000"/>
-            <a:ext cx="8520600" cy="607800"/>
-          </a:xfrm>
-          <a:prstGeom prst="rect">
-            <a:avLst/>
-          </a:prstGeom>
-        </p:spPr>
-        <p:txBody>
-          <a:bodyPr spcFirstLastPara="1" wrap="square" lIns="91425" tIns="91425" rIns="91425" bIns="91425" anchor="t" anchorCtr="0">
-            <a:noAutofit/>
-          </a:bodyPr>
-          <a:lstStyle/>
-          <a:p>
-            <a:pPr marL="0" lvl="0" indent="0" algn="l" rtl="0">
-              <a:spcBef>
-                <a:spcPts val="0"/>
-              </a:spcBef>
-              <a:spcAft>
-                <a:spcPts val="0"/>
-              </a:spcAft>
-              <a:buNone/>
-            </a:pPr>
-            <a:r>
-              <a:rPr lang="en-GB"/>
-              <a:t>What is Kafka</a:t>
-            </a:r>
-            <a:endParaRPr/>
-          </a:p>
-        </p:txBody>
-      </p:sp>
-      <p:sp>
-        <p:nvSpPr>
-          <p:cNvPr id="97" name="Google Shape;97;p15"/>
-          <p:cNvSpPr txBox="1">
-            <a:spLocks noGrp="1"/>
-          </p:cNvSpPr>
-          <p:nvPr>
-            <p:ph type="body" idx="1"/>
-          </p:nvPr>
-        </p:nvSpPr>
-        <p:spPr>
-          <a:xfrm>
-            <a:off x="311700" y="1229875"/>
-            <a:ext cx="8520600" cy="3339000"/>
-          </a:xfrm>
-          <a:prstGeom prst="rect">
-            <a:avLst/>
-          </a:prstGeom>
-        </p:spPr>
-        <p:txBody>
-          <a:bodyPr spcFirstLastPara="1" wrap="square" lIns="91425" tIns="91425" rIns="91425" bIns="91425" anchor="t" anchorCtr="0">
-            <a:noAutofit/>
-          </a:bodyPr>
-          <a:lstStyle/>
-          <a:p>
-            <a:pPr marL="0" lvl="0" indent="0" algn="l" rtl="0">
-              <a:spcBef>
-                <a:spcPts val="0"/>
-              </a:spcBef>
-              <a:spcAft>
-                <a:spcPts val="1600"/>
-              </a:spcAft>
-              <a:buNone/>
-            </a:pPr>
-            <a:r>
-              <a:rPr lang="en-GB"/>
-              <a:t>Distributed streaming platform  </a:t>
-            </a:r>
-            <a:endParaRPr/>
-          </a:p>
-        </p:txBody>
-      </p:sp>
-      <p:pic>
-        <p:nvPicPr>
-          <p:cNvPr id="98" name="Google Shape;98;p15"/>
-          <p:cNvPicPr preferRelativeResize="0"/>
-          <p:nvPr/>
-        </p:nvPicPr>
-        <p:blipFill>
-          <a:blip r:embed="rId3">
-            <a:alphaModFix/>
-          </a:blip>
-          <a:stretch>
-            <a:fillRect/>
-          </a:stretch>
-        </p:blipFill>
-        <p:spPr>
-          <a:xfrm>
-            <a:off x="3826175" y="162875"/>
-            <a:ext cx="5317824" cy="4714202"/>
-          </a:xfrm>
-          <a:prstGeom prst="rect">
-            <a:avLst/>
-          </a:prstGeom>
-          <a:noFill/>
-          <a:ln>
-            <a:noFill/>
-          </a:ln>
-        </p:spPr>
-      </p:pic>
-    </p:spTree>
-  </p:cSld>
-  <p:clrMapOvr>
-    <a:masterClrMapping/>
-  </p:clrMapOvr>
-</p:sld>
-</file>
-
-<file path=ppt/slides/slide30.xml><?xml version="1.0" encoding="utf-8"?>
+<file path=ppt/slides/slide32.xml><?xml version="1.0" encoding="utf-8"?>
 <p:sld xmlns:a="http://schemas.openxmlformats.org/drawingml/2006/main" xmlns:r="http://schemas.openxmlformats.org/officeDocument/2006/relationships" xmlns:p="http://schemas.openxmlformats.org/presentationml/2006/main">
   <p:cSld>
     <p:spTree>
@@ -22434,111 +22380,6 @@
 </file>
 
 <file path=ppt/slides/slide4.xml><?xml version="1.0" encoding="utf-8"?>
-<p:sld xmlns:a="http://schemas.openxmlformats.org/drawingml/2006/main" xmlns:r="http://schemas.openxmlformats.org/officeDocument/2006/relationships" xmlns:p="http://schemas.openxmlformats.org/presentationml/2006/main">
-  <p:cSld>
-    <p:spTree>
-      <p:nvGrpSpPr>
-        <p:cNvPr id="1" name="Shape 102"/>
-        <p:cNvGrpSpPr/>
-        <p:nvPr/>
-      </p:nvGrpSpPr>
-      <p:grpSpPr>
-        <a:xfrm>
-          <a:off x="0" y="0"/>
-          <a:ext cx="0" cy="0"/>
-          <a:chOff x="0" y="0"/>
-          <a:chExt cx="0" cy="0"/>
-        </a:xfrm>
-      </p:grpSpPr>
-      <p:sp>
-        <p:nvSpPr>
-          <p:cNvPr id="103" name="Google Shape;103;p16"/>
-          <p:cNvSpPr txBox="1">
-            <a:spLocks noGrp="1"/>
-          </p:cNvSpPr>
-          <p:nvPr>
-            <p:ph type="title"/>
-          </p:nvPr>
-        </p:nvSpPr>
-        <p:spPr>
-          <a:xfrm>
-            <a:off x="311700" y="410000"/>
-            <a:ext cx="8520600" cy="607800"/>
-          </a:xfrm>
-          <a:prstGeom prst="rect">
-            <a:avLst/>
-          </a:prstGeom>
-        </p:spPr>
-        <p:txBody>
-          <a:bodyPr spcFirstLastPara="1" wrap="square" lIns="91425" tIns="91425" rIns="91425" bIns="91425" anchor="t" anchorCtr="0">
-            <a:noAutofit/>
-          </a:bodyPr>
-          <a:lstStyle/>
-          <a:p>
-            <a:pPr marL="0" lvl="0" indent="0" algn="l" rtl="0">
-              <a:spcBef>
-                <a:spcPts val="0"/>
-              </a:spcBef>
-              <a:spcAft>
-                <a:spcPts val="0"/>
-              </a:spcAft>
-              <a:buNone/>
-            </a:pPr>
-            <a:r>
-              <a:rPr lang="en-GB" dirty="0"/>
-              <a:t>                       Benefits of using Kafka</a:t>
-            </a:r>
-            <a:endParaRPr dirty="0"/>
-          </a:p>
-        </p:txBody>
-      </p:sp>
-      <p:sp>
-        <p:nvSpPr>
-          <p:cNvPr id="104" name="Google Shape;104;p16"/>
-          <p:cNvSpPr txBox="1">
-            <a:spLocks noGrp="1"/>
-          </p:cNvSpPr>
-          <p:nvPr>
-            <p:ph type="body" idx="1"/>
-          </p:nvPr>
-        </p:nvSpPr>
-        <p:spPr>
-          <a:xfrm>
-            <a:off x="311700" y="1229875"/>
-            <a:ext cx="8520600" cy="3339000"/>
-          </a:xfrm>
-          <a:prstGeom prst="rect">
-            <a:avLst/>
-          </a:prstGeom>
-        </p:spPr>
-        <p:txBody>
-          <a:bodyPr spcFirstLastPara="1" wrap="square" lIns="91425" tIns="91425" rIns="91425" bIns="91425" anchor="t" anchorCtr="0">
-            <a:noAutofit/>
-          </a:bodyPr>
-          <a:lstStyle/>
-          <a:p>
-            <a:pPr marL="0" lvl="0" indent="0" algn="l" rtl="0">
-              <a:spcBef>
-                <a:spcPts val="0"/>
-              </a:spcBef>
-              <a:spcAft>
-                <a:spcPts val="1600"/>
-              </a:spcAft>
-              <a:buNone/>
-            </a:pPr>
-            <a:endParaRPr dirty="0"/>
-          </a:p>
-        </p:txBody>
-      </p:sp>
-    </p:spTree>
-  </p:cSld>
-  <p:clrMapOvr>
-    <a:masterClrMapping/>
-  </p:clrMapOvr>
-</p:sld>
-</file>
-
-<file path=ppt/slides/slide5.xml><?xml version="1.0" encoding="utf-8"?>
 <p:sld xmlns:a="http://schemas.openxmlformats.org/drawingml/2006/main" xmlns:r="http://schemas.openxmlformats.org/officeDocument/2006/relationships" xmlns:p="http://schemas.openxmlformats.org/presentationml/2006/main">
   <p:cSld>
     <p:spTree>
@@ -23003,7 +22844,7 @@
 </p:sld>
 </file>
 
-<file path=ppt/slides/slide6.xml><?xml version="1.0" encoding="utf-8"?>
+<file path=ppt/slides/slide5.xml><?xml version="1.0" encoding="utf-8"?>
 <p:sld xmlns:a="http://schemas.openxmlformats.org/drawingml/2006/main" xmlns:r="http://schemas.openxmlformats.org/officeDocument/2006/relationships" xmlns:p="http://schemas.openxmlformats.org/presentationml/2006/main">
   <p:cSld>
     <p:spTree>
@@ -23112,7 +22953,7 @@
 </p:sld>
 </file>
 
-<file path=ppt/slides/slide7.xml><?xml version="1.0" encoding="utf-8"?>
+<file path=ppt/slides/slide6.xml><?xml version="1.0" encoding="utf-8"?>
 <p:sld xmlns:a="http://schemas.openxmlformats.org/drawingml/2006/main" xmlns:r="http://schemas.openxmlformats.org/officeDocument/2006/relationships" xmlns:p="http://schemas.openxmlformats.org/presentationml/2006/main">
   <p:cSld>
     <p:spTree>
@@ -23244,7 +23085,7 @@
 </p:sld>
 </file>
 
-<file path=ppt/slides/slide8.xml><?xml version="1.0" encoding="utf-8"?>
+<file path=ppt/slides/slide7.xml><?xml version="1.0" encoding="utf-8"?>
 <p:sld xmlns:a="http://schemas.openxmlformats.org/drawingml/2006/main" xmlns:r="http://schemas.openxmlformats.org/officeDocument/2006/relationships" xmlns:p="http://schemas.openxmlformats.org/presentationml/2006/main">
   <p:cSld>
     <p:spTree>
@@ -23944,7 +23785,7 @@
 </p:sld>
 </file>
 
-<file path=ppt/slides/slide9.xml><?xml version="1.0" encoding="utf-8"?>
+<file path=ppt/slides/slide8.xml><?xml version="1.0" encoding="utf-8"?>
 <p:sld xmlns:a="http://schemas.openxmlformats.org/drawingml/2006/main" xmlns:r="http://schemas.openxmlformats.org/officeDocument/2006/relationships" xmlns:p="http://schemas.openxmlformats.org/presentationml/2006/main">
   <p:cSld>
     <p:spTree>
@@ -24413,6 +24254,494 @@
           <a:xfrm>
             <a:off x="5955625" y="3391850"/>
             <a:ext cx="1138500" cy="907800"/>
+          </a:xfrm>
+          <a:prstGeom prst="straightConnector1">
+            <a:avLst/>
+          </a:prstGeom>
+          <a:noFill/>
+          <a:ln w="9525" cap="flat" cmpd="sng">
+            <a:solidFill>
+              <a:schemeClr val="dk2"/>
+            </a:solidFill>
+            <a:prstDash val="solid"/>
+            <a:round/>
+            <a:headEnd type="none" w="med" len="med"/>
+            <a:tailEnd type="triangle" w="med" len="med"/>
+          </a:ln>
+        </p:spPr>
+      </p:cxnSp>
+    </p:spTree>
+  </p:cSld>
+  <p:clrMapOvr>
+    <a:masterClrMapping/>
+  </p:clrMapOvr>
+</p:sld>
+</file>
+
+<file path=ppt/slides/slide9.xml><?xml version="1.0" encoding="utf-8"?>
+<p:sld xmlns:a="http://schemas.openxmlformats.org/drawingml/2006/main" xmlns:r="http://schemas.openxmlformats.org/officeDocument/2006/relationships" xmlns:p="http://schemas.openxmlformats.org/presentationml/2006/main">
+  <p:cSld>
+    <p:spTree>
+      <p:nvGrpSpPr>
+        <p:cNvPr id="1" name="Shape 152"/>
+        <p:cNvGrpSpPr/>
+        <p:nvPr/>
+      </p:nvGrpSpPr>
+      <p:grpSpPr>
+        <a:xfrm>
+          <a:off x="0" y="0"/>
+          <a:ext cx="0" cy="0"/>
+          <a:chOff x="0" y="0"/>
+          <a:chExt cx="0" cy="0"/>
+        </a:xfrm>
+      </p:grpSpPr>
+      <p:sp>
+        <p:nvSpPr>
+          <p:cNvPr id="153" name="Google Shape;153;p22"/>
+          <p:cNvSpPr txBox="1">
+            <a:spLocks noGrp="1"/>
+          </p:cNvSpPr>
+          <p:nvPr>
+            <p:ph type="title"/>
+          </p:nvPr>
+        </p:nvSpPr>
+        <p:spPr>
+          <a:xfrm>
+            <a:off x="311700" y="410000"/>
+            <a:ext cx="8520600" cy="607800"/>
+          </a:xfrm>
+          <a:prstGeom prst="rect">
+            <a:avLst/>
+          </a:prstGeom>
+        </p:spPr>
+        <p:txBody>
+          <a:bodyPr spcFirstLastPara="1" wrap="square" lIns="91425" tIns="91425" rIns="91425" bIns="91425" anchor="t" anchorCtr="0">
+            <a:noAutofit/>
+          </a:bodyPr>
+          <a:lstStyle/>
+          <a:p>
+            <a:pPr marL="0" lvl="0" indent="0" algn="l" rtl="0">
+              <a:spcBef>
+                <a:spcPts val="0"/>
+              </a:spcBef>
+              <a:spcAft>
+                <a:spcPts val="0"/>
+              </a:spcAft>
+              <a:buNone/>
+            </a:pPr>
+            <a:r>
+              <a:rPr lang="en-GB" dirty="0"/>
+              <a:t>                                       Broker</a:t>
+            </a:r>
+            <a:endParaRPr dirty="0"/>
+          </a:p>
+        </p:txBody>
+      </p:sp>
+      <p:sp>
+        <p:nvSpPr>
+          <p:cNvPr id="154" name="Google Shape;154;p22"/>
+          <p:cNvSpPr txBox="1">
+            <a:spLocks noGrp="1"/>
+          </p:cNvSpPr>
+          <p:nvPr>
+            <p:ph type="body" idx="1"/>
+          </p:nvPr>
+        </p:nvSpPr>
+        <p:spPr>
+          <a:xfrm>
+            <a:off x="311700" y="1229875"/>
+            <a:ext cx="8520600" cy="3339000"/>
+          </a:xfrm>
+          <a:prstGeom prst="rect">
+            <a:avLst/>
+          </a:prstGeom>
+        </p:spPr>
+        <p:txBody>
+          <a:bodyPr spcFirstLastPara="1" wrap="square" lIns="91425" tIns="91425" rIns="91425" bIns="91425" anchor="t" anchorCtr="0">
+            <a:noAutofit/>
+          </a:bodyPr>
+          <a:lstStyle/>
+          <a:p>
+            <a:pPr marL="0" lvl="0" indent="0" algn="l" rtl="0">
+              <a:spcBef>
+                <a:spcPts val="0"/>
+              </a:spcBef>
+              <a:spcAft>
+                <a:spcPts val="1600"/>
+              </a:spcAft>
+              <a:buNone/>
+            </a:pPr>
+            <a:r>
+              <a:rPr lang="en-GB"/>
+              <a:t>Kafka server</a:t>
+            </a:r>
+            <a:endParaRPr/>
+          </a:p>
+        </p:txBody>
+      </p:sp>
+      <p:sp>
+        <p:nvSpPr>
+          <p:cNvPr id="155" name="Google Shape;155;p22"/>
+          <p:cNvSpPr/>
+          <p:nvPr/>
+        </p:nvSpPr>
+        <p:spPr>
+          <a:xfrm>
+            <a:off x="96725" y="1829925"/>
+            <a:ext cx="2078100" cy="607800"/>
+          </a:xfrm>
+          <a:prstGeom prst="rect">
+            <a:avLst/>
+          </a:prstGeom>
+          <a:solidFill>
+            <a:schemeClr val="lt2"/>
+          </a:solidFill>
+          <a:ln w="9525" cap="flat" cmpd="sng">
+            <a:solidFill>
+              <a:schemeClr val="dk2"/>
+            </a:solidFill>
+            <a:prstDash val="solid"/>
+            <a:round/>
+            <a:headEnd type="none" w="sm" len="sm"/>
+            <a:tailEnd type="none" w="sm" len="sm"/>
+          </a:ln>
+        </p:spPr>
+        <p:txBody>
+          <a:bodyPr spcFirstLastPara="1" wrap="square" lIns="91425" tIns="91425" rIns="91425" bIns="91425" anchor="ctr" anchorCtr="0">
+            <a:noAutofit/>
+          </a:bodyPr>
+          <a:lstStyle/>
+          <a:p>
+            <a:pPr marL="0" lvl="0" indent="0" algn="l" rtl="0">
+              <a:spcBef>
+                <a:spcPts val="0"/>
+              </a:spcBef>
+              <a:spcAft>
+                <a:spcPts val="0"/>
+              </a:spcAft>
+              <a:buNone/>
+            </a:pPr>
+            <a:r>
+              <a:rPr lang="en-GB" dirty="0"/>
+              <a:t>Producer 1</a:t>
+            </a:r>
+            <a:endParaRPr dirty="0"/>
+          </a:p>
+        </p:txBody>
+      </p:sp>
+      <p:sp>
+        <p:nvSpPr>
+          <p:cNvPr id="156" name="Google Shape;156;p22"/>
+          <p:cNvSpPr/>
+          <p:nvPr/>
+        </p:nvSpPr>
+        <p:spPr>
+          <a:xfrm>
+            <a:off x="51375" y="3370625"/>
+            <a:ext cx="2078100" cy="607800"/>
+          </a:xfrm>
+          <a:prstGeom prst="rect">
+            <a:avLst/>
+          </a:prstGeom>
+          <a:solidFill>
+            <a:schemeClr val="lt2"/>
+          </a:solidFill>
+          <a:ln w="9525" cap="flat" cmpd="sng">
+            <a:solidFill>
+              <a:schemeClr val="dk2"/>
+            </a:solidFill>
+            <a:prstDash val="solid"/>
+            <a:round/>
+            <a:headEnd type="none" w="sm" len="sm"/>
+            <a:tailEnd type="none" w="sm" len="sm"/>
+          </a:ln>
+        </p:spPr>
+        <p:txBody>
+          <a:bodyPr spcFirstLastPara="1" wrap="square" lIns="91425" tIns="91425" rIns="91425" bIns="91425" anchor="ctr" anchorCtr="0">
+            <a:noAutofit/>
+          </a:bodyPr>
+          <a:lstStyle/>
+          <a:p>
+            <a:pPr marL="0" lvl="0" indent="0" algn="l" rtl="0">
+              <a:spcBef>
+                <a:spcPts val="0"/>
+              </a:spcBef>
+              <a:spcAft>
+                <a:spcPts val="0"/>
+              </a:spcAft>
+              <a:buNone/>
+            </a:pPr>
+            <a:r>
+              <a:rPr lang="en-GB" dirty="0"/>
+              <a:t>Producer 2</a:t>
+            </a:r>
+            <a:endParaRPr dirty="0"/>
+          </a:p>
+        </p:txBody>
+      </p:sp>
+      <p:sp>
+        <p:nvSpPr>
+          <p:cNvPr id="157" name="Google Shape;157;p22"/>
+          <p:cNvSpPr/>
+          <p:nvPr/>
+        </p:nvSpPr>
+        <p:spPr>
+          <a:xfrm>
+            <a:off x="3256500" y="1934775"/>
+            <a:ext cx="2683200" cy="2245200"/>
+          </a:xfrm>
+          <a:prstGeom prst="rect">
+            <a:avLst/>
+          </a:prstGeom>
+          <a:solidFill>
+            <a:schemeClr val="lt2"/>
+          </a:solidFill>
+          <a:ln w="9525" cap="flat" cmpd="sng">
+            <a:solidFill>
+              <a:schemeClr val="dk2"/>
+            </a:solidFill>
+            <a:prstDash val="dash"/>
+            <a:round/>
+            <a:headEnd type="none" w="sm" len="sm"/>
+            <a:tailEnd type="none" w="sm" len="sm"/>
+          </a:ln>
+        </p:spPr>
+        <p:txBody>
+          <a:bodyPr spcFirstLastPara="1" wrap="square" lIns="91425" tIns="91425" rIns="91425" bIns="91425" anchor="ctr" anchorCtr="0">
+            <a:noAutofit/>
+          </a:bodyPr>
+          <a:lstStyle/>
+          <a:p>
+            <a:pPr marL="0" lvl="0" indent="0" algn="l" rtl="0">
+              <a:spcBef>
+                <a:spcPts val="0"/>
+              </a:spcBef>
+              <a:spcAft>
+                <a:spcPts val="0"/>
+              </a:spcAft>
+              <a:buNone/>
+            </a:pPr>
+            <a:r>
+              <a:rPr lang="en-GB" dirty="0"/>
+              <a:t>                Kafka server</a:t>
+            </a:r>
+            <a:endParaRPr dirty="0"/>
+          </a:p>
+          <a:p>
+            <a:pPr marL="0" lvl="0" indent="0" algn="l" rtl="0">
+              <a:spcBef>
+                <a:spcPts val="0"/>
+              </a:spcBef>
+              <a:spcAft>
+                <a:spcPts val="0"/>
+              </a:spcAft>
+              <a:buNone/>
+            </a:pPr>
+            <a:r>
+              <a:rPr lang="en-GB" dirty="0"/>
+              <a:t>                  (Broker)</a:t>
+            </a:r>
+            <a:endParaRPr dirty="0"/>
+          </a:p>
+        </p:txBody>
+      </p:sp>
+      <p:sp>
+        <p:nvSpPr>
+          <p:cNvPr id="158" name="Google Shape;158;p22"/>
+          <p:cNvSpPr/>
+          <p:nvPr/>
+        </p:nvSpPr>
+        <p:spPr>
+          <a:xfrm>
+            <a:off x="7033800" y="1998250"/>
+            <a:ext cx="2078100" cy="607800"/>
+          </a:xfrm>
+          <a:prstGeom prst="rect">
+            <a:avLst/>
+          </a:prstGeom>
+          <a:solidFill>
+            <a:schemeClr val="lt2"/>
+          </a:solidFill>
+          <a:ln w="9525" cap="flat" cmpd="sng">
+            <a:solidFill>
+              <a:schemeClr val="dk2"/>
+            </a:solidFill>
+            <a:prstDash val="solid"/>
+            <a:round/>
+            <a:headEnd type="none" w="sm" len="sm"/>
+            <a:tailEnd type="none" w="sm" len="sm"/>
+          </a:ln>
+        </p:spPr>
+        <p:txBody>
+          <a:bodyPr spcFirstLastPara="1" wrap="square" lIns="91425" tIns="91425" rIns="91425" bIns="91425" anchor="ctr" anchorCtr="0">
+            <a:noAutofit/>
+          </a:bodyPr>
+          <a:lstStyle/>
+          <a:p>
+            <a:pPr marL="0" lvl="0" indent="0" algn="l" rtl="0">
+              <a:spcBef>
+                <a:spcPts val="0"/>
+              </a:spcBef>
+              <a:spcAft>
+                <a:spcPts val="0"/>
+              </a:spcAft>
+              <a:buNone/>
+            </a:pPr>
+            <a:r>
+              <a:rPr lang="en-GB"/>
+              <a:t>Consumer 1</a:t>
+            </a:r>
+            <a:endParaRPr/>
+          </a:p>
+        </p:txBody>
+      </p:sp>
+      <p:sp>
+        <p:nvSpPr>
+          <p:cNvPr id="159" name="Google Shape;159;p22"/>
+          <p:cNvSpPr/>
+          <p:nvPr/>
+        </p:nvSpPr>
+        <p:spPr>
+          <a:xfrm>
+            <a:off x="7103350" y="4179975"/>
+            <a:ext cx="2078100" cy="607800"/>
+          </a:xfrm>
+          <a:prstGeom prst="rect">
+            <a:avLst/>
+          </a:prstGeom>
+          <a:solidFill>
+            <a:schemeClr val="lt2"/>
+          </a:solidFill>
+          <a:ln w="9525" cap="flat" cmpd="sng">
+            <a:solidFill>
+              <a:schemeClr val="dk2"/>
+            </a:solidFill>
+            <a:prstDash val="solid"/>
+            <a:round/>
+            <a:headEnd type="none" w="sm" len="sm"/>
+            <a:tailEnd type="none" w="sm" len="sm"/>
+          </a:ln>
+        </p:spPr>
+        <p:txBody>
+          <a:bodyPr spcFirstLastPara="1" wrap="square" lIns="91425" tIns="91425" rIns="91425" bIns="91425" anchor="ctr" anchorCtr="0">
+            <a:noAutofit/>
+          </a:bodyPr>
+          <a:lstStyle/>
+          <a:p>
+            <a:pPr marL="0" lvl="0" indent="0" algn="l" rtl="0">
+              <a:spcBef>
+                <a:spcPts val="0"/>
+              </a:spcBef>
+              <a:spcAft>
+                <a:spcPts val="0"/>
+              </a:spcAft>
+              <a:buNone/>
+            </a:pPr>
+            <a:r>
+              <a:rPr lang="en-GB"/>
+              <a:t>Consumer 2</a:t>
+            </a:r>
+            <a:endParaRPr/>
+          </a:p>
+        </p:txBody>
+      </p:sp>
+      <p:cxnSp>
+        <p:nvCxnSpPr>
+          <p:cNvPr id="160" name="Google Shape;160;p22"/>
+          <p:cNvCxnSpPr>
+            <a:stCxn id="155" idx="3"/>
+          </p:cNvCxnSpPr>
+          <p:nvPr/>
+        </p:nvCxnSpPr>
+        <p:spPr>
+          <a:xfrm>
+            <a:off x="2174825" y="2133825"/>
+            <a:ext cx="1081800" cy="546000"/>
+          </a:xfrm>
+          <a:prstGeom prst="straightConnector1">
+            <a:avLst/>
+          </a:prstGeom>
+          <a:noFill/>
+          <a:ln w="9525" cap="flat" cmpd="sng">
+            <a:solidFill>
+              <a:schemeClr val="dk2"/>
+            </a:solidFill>
+            <a:prstDash val="solid"/>
+            <a:round/>
+            <a:headEnd type="none" w="med" len="med"/>
+            <a:tailEnd type="triangle" w="med" len="med"/>
+          </a:ln>
+        </p:spPr>
+      </p:cxnSp>
+      <p:cxnSp>
+        <p:nvCxnSpPr>
+          <p:cNvPr id="161" name="Google Shape;161;p22"/>
+          <p:cNvCxnSpPr>
+            <a:stCxn id="156" idx="3"/>
+            <a:endCxn id="157" idx="1"/>
+          </p:cNvCxnSpPr>
+          <p:nvPr/>
+        </p:nvCxnSpPr>
+        <p:spPr>
+          <a:xfrm rot="10800000" flipH="1">
+            <a:off x="2129475" y="3057425"/>
+            <a:ext cx="1127100" cy="617100"/>
+          </a:xfrm>
+          <a:prstGeom prst="straightConnector1">
+            <a:avLst/>
+          </a:prstGeom>
+          <a:noFill/>
+          <a:ln w="9525" cap="flat" cmpd="sng">
+            <a:solidFill>
+              <a:schemeClr val="dk2"/>
+            </a:solidFill>
+            <a:prstDash val="solid"/>
+            <a:round/>
+            <a:headEnd type="none" w="med" len="med"/>
+            <a:tailEnd type="triangle" w="med" len="med"/>
+          </a:ln>
+        </p:spPr>
+      </p:cxnSp>
+      <p:cxnSp>
+        <p:nvCxnSpPr>
+          <p:cNvPr id="162" name="Google Shape;162;p22"/>
+          <p:cNvCxnSpPr>
+            <a:endCxn id="158" idx="1"/>
+          </p:cNvCxnSpPr>
+          <p:nvPr/>
+        </p:nvCxnSpPr>
+        <p:spPr>
+          <a:xfrm rot="10800000" flipH="1">
+            <a:off x="5955600" y="2302150"/>
+            <a:ext cx="1078200" cy="297900"/>
+          </a:xfrm>
+          <a:prstGeom prst="straightConnector1">
+            <a:avLst/>
+          </a:prstGeom>
+          <a:noFill/>
+          <a:ln w="9525" cap="flat" cmpd="sng">
+            <a:solidFill>
+              <a:schemeClr val="dk2"/>
+            </a:solidFill>
+            <a:prstDash val="solid"/>
+            <a:round/>
+            <a:headEnd type="none" w="med" len="med"/>
+            <a:tailEnd type="triangle" w="med" len="med"/>
+          </a:ln>
+        </p:spPr>
+      </p:cxnSp>
+      <p:cxnSp>
+        <p:nvCxnSpPr>
+          <p:cNvPr id="163" name="Google Shape;163;p22"/>
+          <p:cNvCxnSpPr>
+            <a:endCxn id="159" idx="1"/>
+          </p:cNvCxnSpPr>
+          <p:nvPr/>
+        </p:nvCxnSpPr>
+        <p:spPr>
+          <a:xfrm>
+            <a:off x="5931850" y="3579375"/>
+            <a:ext cx="1171500" cy="904500"/>
           </a:xfrm>
           <a:prstGeom prst="straightConnector1">
             <a:avLst/>

</xml_diff>